<commit_message>
MAJ géometrie (Cours et TD)
</commit_message>
<xml_diff>
--- a/02_GeometrieVectorielle/Cours/png/Figures1.pptx
+++ b/02_GeometrieVectorielle/Cours/png/Figures1.pptx
@@ -16,6 +16,8 @@
     <p:sldId id="263" r:id="rId10"/>
     <p:sldId id="264" r:id="rId11"/>
     <p:sldId id="265" r:id="rId12"/>
+    <p:sldId id="267" r:id="rId13"/>
+    <p:sldId id="268" r:id="rId14"/>
   </p:sldIdLst>
   <p:sldSz cx="9144000" cy="6858000" type="screen4x3"/>
   <p:notesSz cx="6858000" cy="9144000"/>
@@ -298,7 +300,8 @@
           <a:p>
             <a:fld id="{AA309A6D-C09C-4548-B29A-6CF363A7E532}" type="datetimeFigureOut">
               <a:rPr lang="fr-FR" smtClean="0"/>
-              <a:t>31/10/2013</a:t>
+              <a:pPr/>
+              <a:t>05/11/2013</a:t>
             </a:fld>
             <a:endParaRPr lang="fr-BE"/>
           </a:p>
@@ -340,6 +343,7 @@
           <a:p>
             <a:fld id="{CF4668DC-857F-487D-BFFA-8C0CA5037977}" type="slidenum">
               <a:rPr lang="fr-BE" smtClean="0"/>
+              <a:pPr/>
               <a:t>‹N°›</a:t>
             </a:fld>
             <a:endParaRPr lang="fr-BE"/>
@@ -463,7 +467,8 @@
           <a:p>
             <a:fld id="{AA309A6D-C09C-4548-B29A-6CF363A7E532}" type="datetimeFigureOut">
               <a:rPr lang="fr-FR" smtClean="0"/>
-              <a:t>31/10/2013</a:t>
+              <a:pPr/>
+              <a:t>05/11/2013</a:t>
             </a:fld>
             <a:endParaRPr lang="fr-BE"/>
           </a:p>
@@ -505,6 +510,7 @@
           <a:p>
             <a:fld id="{CF4668DC-857F-487D-BFFA-8C0CA5037977}" type="slidenum">
               <a:rPr lang="fr-BE" smtClean="0"/>
+              <a:pPr/>
               <a:t>‹N°›</a:t>
             </a:fld>
             <a:endParaRPr lang="fr-BE"/>
@@ -638,7 +644,8 @@
           <a:p>
             <a:fld id="{AA309A6D-C09C-4548-B29A-6CF363A7E532}" type="datetimeFigureOut">
               <a:rPr lang="fr-FR" smtClean="0"/>
-              <a:t>31/10/2013</a:t>
+              <a:pPr/>
+              <a:t>05/11/2013</a:t>
             </a:fld>
             <a:endParaRPr lang="fr-BE"/>
           </a:p>
@@ -680,6 +687,7 @@
           <a:p>
             <a:fld id="{CF4668DC-857F-487D-BFFA-8C0CA5037977}" type="slidenum">
               <a:rPr lang="fr-BE" smtClean="0"/>
+              <a:pPr/>
               <a:t>‹N°›</a:t>
             </a:fld>
             <a:endParaRPr lang="fr-BE"/>
@@ -803,7 +811,8 @@
           <a:p>
             <a:fld id="{AA309A6D-C09C-4548-B29A-6CF363A7E532}" type="datetimeFigureOut">
               <a:rPr lang="fr-FR" smtClean="0"/>
-              <a:t>31/10/2013</a:t>
+              <a:pPr/>
+              <a:t>05/11/2013</a:t>
             </a:fld>
             <a:endParaRPr lang="fr-BE"/>
           </a:p>
@@ -845,6 +854,7 @@
           <a:p>
             <a:fld id="{CF4668DC-857F-487D-BFFA-8C0CA5037977}" type="slidenum">
               <a:rPr lang="fr-BE" smtClean="0"/>
+              <a:pPr/>
               <a:t>‹N°›</a:t>
             </a:fld>
             <a:endParaRPr lang="fr-BE"/>
@@ -1044,7 +1054,8 @@
           <a:p>
             <a:fld id="{AA309A6D-C09C-4548-B29A-6CF363A7E532}" type="datetimeFigureOut">
               <a:rPr lang="fr-FR" smtClean="0"/>
-              <a:t>31/10/2013</a:t>
+              <a:pPr/>
+              <a:t>05/11/2013</a:t>
             </a:fld>
             <a:endParaRPr lang="fr-BE"/>
           </a:p>
@@ -1086,6 +1097,7 @@
           <a:p>
             <a:fld id="{CF4668DC-857F-487D-BFFA-8C0CA5037977}" type="slidenum">
               <a:rPr lang="fr-BE" smtClean="0"/>
+              <a:pPr/>
               <a:t>‹N°›</a:t>
             </a:fld>
             <a:endParaRPr lang="fr-BE"/>
@@ -1327,7 +1339,8 @@
           <a:p>
             <a:fld id="{AA309A6D-C09C-4548-B29A-6CF363A7E532}" type="datetimeFigureOut">
               <a:rPr lang="fr-FR" smtClean="0"/>
-              <a:t>31/10/2013</a:t>
+              <a:pPr/>
+              <a:t>05/11/2013</a:t>
             </a:fld>
             <a:endParaRPr lang="fr-BE"/>
           </a:p>
@@ -1369,6 +1382,7 @@
           <a:p>
             <a:fld id="{CF4668DC-857F-487D-BFFA-8C0CA5037977}" type="slidenum">
               <a:rPr lang="fr-BE" smtClean="0"/>
+              <a:pPr/>
               <a:t>‹N°›</a:t>
             </a:fld>
             <a:endParaRPr lang="fr-BE"/>
@@ -1744,7 +1758,8 @@
           <a:p>
             <a:fld id="{AA309A6D-C09C-4548-B29A-6CF363A7E532}" type="datetimeFigureOut">
               <a:rPr lang="fr-FR" smtClean="0"/>
-              <a:t>31/10/2013</a:t>
+              <a:pPr/>
+              <a:t>05/11/2013</a:t>
             </a:fld>
             <a:endParaRPr lang="fr-BE"/>
           </a:p>
@@ -1786,6 +1801,7 @@
           <a:p>
             <a:fld id="{CF4668DC-857F-487D-BFFA-8C0CA5037977}" type="slidenum">
               <a:rPr lang="fr-BE" smtClean="0"/>
+              <a:pPr/>
               <a:t>‹N°›</a:t>
             </a:fld>
             <a:endParaRPr lang="fr-BE"/>
@@ -1857,7 +1873,8 @@
           <a:p>
             <a:fld id="{AA309A6D-C09C-4548-B29A-6CF363A7E532}" type="datetimeFigureOut">
               <a:rPr lang="fr-FR" smtClean="0"/>
-              <a:t>31/10/2013</a:t>
+              <a:pPr/>
+              <a:t>05/11/2013</a:t>
             </a:fld>
             <a:endParaRPr lang="fr-BE"/>
           </a:p>
@@ -1899,6 +1916,7 @@
           <a:p>
             <a:fld id="{CF4668DC-857F-487D-BFFA-8C0CA5037977}" type="slidenum">
               <a:rPr lang="fr-BE" smtClean="0"/>
+              <a:pPr/>
               <a:t>‹N°›</a:t>
             </a:fld>
             <a:endParaRPr lang="fr-BE"/>
@@ -1947,7 +1965,8 @@
           <a:p>
             <a:fld id="{AA309A6D-C09C-4548-B29A-6CF363A7E532}" type="datetimeFigureOut">
               <a:rPr lang="fr-FR" smtClean="0"/>
-              <a:t>31/10/2013</a:t>
+              <a:pPr/>
+              <a:t>05/11/2013</a:t>
             </a:fld>
             <a:endParaRPr lang="fr-BE"/>
           </a:p>
@@ -1989,6 +2008,7 @@
           <a:p>
             <a:fld id="{CF4668DC-857F-487D-BFFA-8C0CA5037977}" type="slidenum">
               <a:rPr lang="fr-BE" smtClean="0"/>
+              <a:pPr/>
               <a:t>‹N°›</a:t>
             </a:fld>
             <a:endParaRPr lang="fr-BE"/>
@@ -2219,7 +2239,8 @@
           <a:p>
             <a:fld id="{AA309A6D-C09C-4548-B29A-6CF363A7E532}" type="datetimeFigureOut">
               <a:rPr lang="fr-FR" smtClean="0"/>
-              <a:t>31/10/2013</a:t>
+              <a:pPr/>
+              <a:t>05/11/2013</a:t>
             </a:fld>
             <a:endParaRPr lang="fr-BE"/>
           </a:p>
@@ -2261,6 +2282,7 @@
           <a:p>
             <a:fld id="{CF4668DC-857F-487D-BFFA-8C0CA5037977}" type="slidenum">
               <a:rPr lang="fr-BE" smtClean="0"/>
+              <a:pPr/>
               <a:t>‹N°›</a:t>
             </a:fld>
             <a:endParaRPr lang="fr-BE"/>
@@ -2467,7 +2489,8 @@
           <a:p>
             <a:fld id="{AA309A6D-C09C-4548-B29A-6CF363A7E532}" type="datetimeFigureOut">
               <a:rPr lang="fr-FR" smtClean="0"/>
-              <a:t>31/10/2013</a:t>
+              <a:pPr/>
+              <a:t>05/11/2013</a:t>
             </a:fld>
             <a:endParaRPr lang="fr-BE"/>
           </a:p>
@@ -2509,6 +2532,7 @@
           <a:p>
             <a:fld id="{CF4668DC-857F-487D-BFFA-8C0CA5037977}" type="slidenum">
               <a:rPr lang="fr-BE" smtClean="0"/>
+              <a:pPr/>
               <a:t>‹N°›</a:t>
             </a:fld>
             <a:endParaRPr lang="fr-BE"/>
@@ -2675,7 +2699,8 @@
           <a:p>
             <a:fld id="{AA309A6D-C09C-4548-B29A-6CF363A7E532}" type="datetimeFigureOut">
               <a:rPr lang="fr-FR" smtClean="0"/>
-              <a:t>31/10/2013</a:t>
+              <a:pPr/>
+              <a:t>05/11/2013</a:t>
             </a:fld>
             <a:endParaRPr lang="fr-BE"/>
           </a:p>
@@ -2753,6 +2778,7 @@
           <a:p>
             <a:fld id="{CF4668DC-857F-487D-BFFA-8C0CA5037977}" type="slidenum">
               <a:rPr lang="fr-BE" smtClean="0"/>
+              <a:pPr/>
               <a:t>‹N°›</a:t>
             </a:fld>
             <a:endParaRPr lang="fr-BE"/>
@@ -3057,7 +3083,7 @@
           <a:blip r:embed="rId2">
             <a:extLst>
               <a:ext uri="{28A0092B-C50C-407E-A947-70E740481C1C}">
-                <a14:useLocalDpi xmlns:a14="http://schemas.microsoft.com/office/drawing/2010/main" val="0"/>
+                <a14:useLocalDpi xmlns:a14="http://schemas.microsoft.com/office/drawing/2010/main" xmlns="" val="0"/>
               </a:ext>
             </a:extLst>
           </a:blip>
@@ -3081,14 +3107,14 @@
           <a:effectLst/>
           <a:extLst>
             <a:ext uri="{909E8E84-426E-40DD-AFC4-6F175D3DCCD1}">
-              <a14:hiddenFill xmlns:a14="http://schemas.microsoft.com/office/drawing/2010/main">
+              <a14:hiddenFill xmlns:a14="http://schemas.microsoft.com/office/drawing/2010/main" xmlns="">
                 <a:solidFill>
                   <a:schemeClr val="accent1"/>
                 </a:solidFill>
               </a14:hiddenFill>
             </a:ext>
             <a:ext uri="{91240B29-F687-4F45-9708-019B960494DF}">
-              <a14:hiddenLine xmlns:a14="http://schemas.microsoft.com/office/drawing/2010/main" w="9525">
+              <a14:hiddenLine xmlns:a14="http://schemas.microsoft.com/office/drawing/2010/main" xmlns="" w="9525">
                 <a:solidFill>
                   <a:schemeClr val="tx1"/>
                 </a:solidFill>
@@ -3098,7 +3124,7 @@
               </a14:hiddenLine>
             </a:ext>
             <a:ext uri="{AF507438-7753-43E0-B8FC-AC1667EBCBE1}">
-              <a14:hiddenEffects xmlns:a14="http://schemas.microsoft.com/office/drawing/2010/main">
+              <a14:hiddenEffects xmlns:a14="http://schemas.microsoft.com/office/drawing/2010/main" xmlns="">
                 <a:effectLst>
                   <a:outerShdw dist="35921" dir="2700000" algn="ctr" rotWithShape="0">
                     <a:schemeClr val="bg2"/>
@@ -3217,8 +3243,8 @@
           </a:fontRef>
         </p:style>
       </p:cxnSp>
-      <mc:AlternateContent xmlns:mc="http://schemas.openxmlformats.org/markup-compatibility/2006" xmlns:a14="http://schemas.microsoft.com/office/drawing/2010/main">
-        <mc:Choice Requires="a14">
+      <mc:AlternateContent xmlns:mc="http://schemas.openxmlformats.org/markup-compatibility/2006">
+        <mc:Choice xmlns:a14="http://schemas.microsoft.com/office/drawing/2010/main" xmlns="" Requires="a14">
           <p:sp>
             <p:nvSpPr>
               <p:cNvPr id="20" name="ZoneTexte 19"/>
@@ -3293,7 +3319,7 @@
             </p:txBody>
           </p:sp>
         </mc:Choice>
-        <mc:Fallback xmlns="">
+        <mc:Fallback>
           <p:sp>
             <p:nvSpPr>
               <p:cNvPr id="20" name="ZoneTexte 19"/>
@@ -3332,8 +3358,8 @@
           </p:sp>
         </mc:Fallback>
       </mc:AlternateContent>
-      <mc:AlternateContent xmlns:mc="http://schemas.openxmlformats.org/markup-compatibility/2006" xmlns:a14="http://schemas.microsoft.com/office/drawing/2010/main">
-        <mc:Choice Requires="a14">
+      <mc:AlternateContent xmlns:mc="http://schemas.openxmlformats.org/markup-compatibility/2006">
+        <mc:Choice xmlns:a14="http://schemas.microsoft.com/office/drawing/2010/main" xmlns="" Requires="a14">
           <p:sp>
             <p:nvSpPr>
               <p:cNvPr id="23" name="ZoneTexte 22"/>
@@ -3408,7 +3434,7 @@
             </p:txBody>
           </p:sp>
         </mc:Choice>
-        <mc:Fallback xmlns="">
+        <mc:Fallback>
           <p:sp>
             <p:nvSpPr>
               <p:cNvPr id="23" name="ZoneTexte 22"/>
@@ -3447,8 +3473,8 @@
           </p:sp>
         </mc:Fallback>
       </mc:AlternateContent>
-      <mc:AlternateContent xmlns:mc="http://schemas.openxmlformats.org/markup-compatibility/2006" xmlns:a14="http://schemas.microsoft.com/office/drawing/2010/main">
-        <mc:Choice Requires="a14">
+      <mc:AlternateContent xmlns:mc="http://schemas.openxmlformats.org/markup-compatibility/2006">
+        <mc:Choice xmlns:a14="http://schemas.microsoft.com/office/drawing/2010/main" xmlns="" Requires="a14">
           <p:sp>
             <p:nvSpPr>
               <p:cNvPr id="24" name="ZoneTexte 23"/>
@@ -3523,7 +3549,7 @@
             </p:txBody>
           </p:sp>
         </mc:Choice>
-        <mc:Fallback xmlns="">
+        <mc:Fallback>
           <p:sp>
             <p:nvSpPr>
               <p:cNvPr id="24" name="ZoneTexte 23"/>
@@ -3562,8 +3588,8 @@
           </p:sp>
         </mc:Fallback>
       </mc:AlternateContent>
-      <mc:AlternateContent xmlns:mc="http://schemas.openxmlformats.org/markup-compatibility/2006" xmlns:a14="http://schemas.microsoft.com/office/drawing/2010/main">
-        <mc:Choice Requires="a14">
+      <mc:AlternateContent xmlns:mc="http://schemas.openxmlformats.org/markup-compatibility/2006">
+        <mc:Choice xmlns:a14="http://schemas.microsoft.com/office/drawing/2010/main" xmlns="" Requires="a14">
           <p:sp>
             <p:nvSpPr>
               <p:cNvPr id="25" name="ZoneTexte 24"/>
@@ -3626,7 +3652,7 @@
             </p:txBody>
           </p:sp>
         </mc:Choice>
-        <mc:Fallback xmlns="">
+        <mc:Fallback>
           <p:sp>
             <p:nvSpPr>
               <p:cNvPr id="25" name="ZoneTexte 24"/>
@@ -3668,7 +3694,7 @@
     </p:spTree>
     <p:extLst>
       <p:ext uri="{BB962C8B-B14F-4D97-AF65-F5344CB8AC3E}">
-        <p14:creationId xmlns:p14="http://schemas.microsoft.com/office/powerpoint/2010/main" val="586988952"/>
+        <p14:creationId xmlns:p14="http://schemas.microsoft.com/office/powerpoint/2010/main" xmlns="" val="586988952"/>
       </p:ext>
     </p:extLst>
   </p:cSld>
@@ -5003,7 +5029,7 @@
     </p:spTree>
     <p:extLst>
       <p:ext uri="{BB962C8B-B14F-4D97-AF65-F5344CB8AC3E}">
-        <p14:creationId xmlns:p14="http://schemas.microsoft.com/office/powerpoint/2010/main" val="974897787"/>
+        <p14:creationId xmlns:p14="http://schemas.microsoft.com/office/powerpoint/2010/main" xmlns="" val="974897787"/>
       </p:ext>
     </p:extLst>
   </p:cSld>
@@ -5014,6 +5040,1491 @@
 </file>
 
 <file path=ppt/slides/slide11.xml><?xml version="1.0" encoding="utf-8"?>
+<p:sld xmlns:a="http://schemas.openxmlformats.org/drawingml/2006/main" xmlns:r="http://schemas.openxmlformats.org/officeDocument/2006/relationships" xmlns:p="http://schemas.openxmlformats.org/presentationml/2006/main">
+  <p:cSld>
+    <p:spTree>
+      <p:nvGrpSpPr>
+        <p:cNvPr id="1" name=""/>
+        <p:cNvGrpSpPr/>
+        <p:nvPr/>
+      </p:nvGrpSpPr>
+      <p:grpSpPr>
+        <a:xfrm>
+          <a:off x="0" y="0"/>
+          <a:ext cx="0" cy="0"/>
+          <a:chOff x="0" y="0"/>
+          <a:chExt cx="0" cy="0"/>
+        </a:xfrm>
+      </p:grpSpPr>
+      <p:cxnSp>
+        <p:nvCxnSpPr>
+          <p:cNvPr id="78" name="Connecteur droit 77"/>
+          <p:cNvCxnSpPr/>
+          <p:nvPr/>
+        </p:nvCxnSpPr>
+        <p:spPr>
+          <a:xfrm rot="10800000" flipV="1">
+            <a:off x="615950" y="3940971"/>
+            <a:ext cx="222250" cy="0"/>
+          </a:xfrm>
+          <a:prstGeom prst="line">
+            <a:avLst/>
+          </a:prstGeom>
+          <a:ln w="19050">
+            <a:solidFill>
+              <a:srgbClr val="0070C0"/>
+            </a:solidFill>
+          </a:ln>
+        </p:spPr>
+        <p:style>
+          <a:lnRef idx="1">
+            <a:schemeClr val="accent1"/>
+          </a:lnRef>
+          <a:fillRef idx="0">
+            <a:schemeClr val="accent1"/>
+          </a:fillRef>
+          <a:effectRef idx="0">
+            <a:schemeClr val="accent1"/>
+          </a:effectRef>
+          <a:fontRef idx="minor">
+            <a:schemeClr val="tx1"/>
+          </a:fontRef>
+        </p:style>
+      </p:cxnSp>
+      <p:sp>
+        <p:nvSpPr>
+          <p:cNvPr id="2" name="Titre 1"/>
+          <p:cNvSpPr>
+            <a:spLocks noGrp="1"/>
+          </p:cNvSpPr>
+          <p:nvPr>
+            <p:ph type="title"/>
+          </p:nvPr>
+        </p:nvSpPr>
+        <p:spPr/>
+        <p:txBody>
+          <a:bodyPr/>
+          <a:lstStyle/>
+          <a:p>
+            <a:endParaRPr lang="fr-FR"/>
+          </a:p>
+        </p:txBody>
+      </p:sp>
+      <p:cxnSp>
+        <p:nvCxnSpPr>
+          <p:cNvPr id="4" name="Connecteur droit 3"/>
+          <p:cNvCxnSpPr/>
+          <p:nvPr/>
+        </p:nvCxnSpPr>
+        <p:spPr>
+          <a:xfrm rot="5400000" flipH="1" flipV="1">
+            <a:off x="2571750" y="4140200"/>
+            <a:ext cx="44450" cy="44450"/>
+          </a:xfrm>
+          <a:prstGeom prst="line">
+            <a:avLst/>
+          </a:prstGeom>
+          <a:ln w="9525">
+            <a:solidFill>
+              <a:srgbClr val="00B050"/>
+            </a:solidFill>
+          </a:ln>
+        </p:spPr>
+        <p:style>
+          <a:lnRef idx="1">
+            <a:schemeClr val="accent1"/>
+          </a:lnRef>
+          <a:fillRef idx="0">
+            <a:schemeClr val="accent1"/>
+          </a:fillRef>
+          <a:effectRef idx="0">
+            <a:schemeClr val="accent1"/>
+          </a:effectRef>
+          <a:fontRef idx="minor">
+            <a:schemeClr val="tx1"/>
+          </a:fontRef>
+        </p:style>
+      </p:cxnSp>
+      <p:cxnSp>
+        <p:nvCxnSpPr>
+          <p:cNvPr id="14" name="Connecteur droit 13"/>
+          <p:cNvCxnSpPr/>
+          <p:nvPr/>
+        </p:nvCxnSpPr>
+        <p:spPr>
+          <a:xfrm>
+            <a:off x="2571750" y="4140200"/>
+            <a:ext cx="177800" cy="1588"/>
+          </a:xfrm>
+          <a:prstGeom prst="line">
+            <a:avLst/>
+          </a:prstGeom>
+          <a:ln w="19050">
+            <a:solidFill>
+              <a:srgbClr val="00B050"/>
+            </a:solidFill>
+          </a:ln>
+        </p:spPr>
+        <p:style>
+          <a:lnRef idx="1">
+            <a:schemeClr val="accent1"/>
+          </a:lnRef>
+          <a:fillRef idx="0">
+            <a:schemeClr val="accent1"/>
+          </a:fillRef>
+          <a:effectRef idx="0">
+            <a:schemeClr val="accent1"/>
+          </a:effectRef>
+          <a:fontRef idx="minor">
+            <a:schemeClr val="tx1"/>
+          </a:fontRef>
+        </p:style>
+      </p:cxnSp>
+      <p:sp>
+        <p:nvSpPr>
+          <p:cNvPr id="23" name="Ellipse 22"/>
+          <p:cNvSpPr/>
+          <p:nvPr/>
+        </p:nvSpPr>
+        <p:spPr>
+          <a:xfrm>
+            <a:off x="2571750" y="3829050"/>
+            <a:ext cx="180000" cy="180000"/>
+          </a:xfrm>
+          <a:prstGeom prst="ellipse">
+            <a:avLst/>
+          </a:prstGeom>
+          <a:noFill/>
+          <a:ln w="19050">
+            <a:solidFill>
+              <a:srgbClr val="00B050"/>
+            </a:solidFill>
+          </a:ln>
+        </p:spPr>
+        <p:style>
+          <a:lnRef idx="2">
+            <a:schemeClr val="accent1">
+              <a:shade val="50000"/>
+            </a:schemeClr>
+          </a:lnRef>
+          <a:fillRef idx="1">
+            <a:schemeClr val="accent1"/>
+          </a:fillRef>
+          <a:effectRef idx="0">
+            <a:schemeClr val="accent1"/>
+          </a:effectRef>
+          <a:fontRef idx="minor">
+            <a:schemeClr val="lt1"/>
+          </a:fontRef>
+        </p:style>
+        <p:txBody>
+          <a:bodyPr rtlCol="0" anchor="ctr"/>
+          <a:lstStyle/>
+          <a:p>
+            <a:pPr algn="ctr"/>
+            <a:endParaRPr lang="fr-FR"/>
+          </a:p>
+        </p:txBody>
+      </p:sp>
+      <p:cxnSp>
+        <p:nvCxnSpPr>
+          <p:cNvPr id="28" name="Connecteur droit 27"/>
+          <p:cNvCxnSpPr/>
+          <p:nvPr/>
+        </p:nvCxnSpPr>
+        <p:spPr>
+          <a:xfrm rot="5400000" flipH="1" flipV="1">
+            <a:off x="2595625" y="4071875"/>
+            <a:ext cx="131150" cy="1100"/>
+          </a:xfrm>
+          <a:prstGeom prst="line">
+            <a:avLst/>
+          </a:prstGeom>
+          <a:ln w="19050">
+            <a:solidFill>
+              <a:srgbClr val="00B050"/>
+            </a:solidFill>
+          </a:ln>
+        </p:spPr>
+        <p:style>
+          <a:lnRef idx="1">
+            <a:schemeClr val="accent1"/>
+          </a:lnRef>
+          <a:fillRef idx="0">
+            <a:schemeClr val="accent1"/>
+          </a:fillRef>
+          <a:effectRef idx="0">
+            <a:schemeClr val="accent1"/>
+          </a:effectRef>
+          <a:fontRef idx="minor">
+            <a:schemeClr val="tx1"/>
+          </a:fontRef>
+        </p:style>
+      </p:cxnSp>
+      <p:cxnSp>
+        <p:nvCxnSpPr>
+          <p:cNvPr id="32" name="Connecteur droit 31"/>
+          <p:cNvCxnSpPr/>
+          <p:nvPr/>
+        </p:nvCxnSpPr>
+        <p:spPr>
+          <a:xfrm rot="5400000" flipH="1" flipV="1">
+            <a:off x="2616200" y="4140200"/>
+            <a:ext cx="44450" cy="44450"/>
+          </a:xfrm>
+          <a:prstGeom prst="line">
+            <a:avLst/>
+          </a:prstGeom>
+          <a:ln w="9525">
+            <a:solidFill>
+              <a:srgbClr val="00B050"/>
+            </a:solidFill>
+          </a:ln>
+        </p:spPr>
+        <p:style>
+          <a:lnRef idx="1">
+            <a:schemeClr val="accent1"/>
+          </a:lnRef>
+          <a:fillRef idx="0">
+            <a:schemeClr val="accent1"/>
+          </a:fillRef>
+          <a:effectRef idx="0">
+            <a:schemeClr val="accent1"/>
+          </a:effectRef>
+          <a:fontRef idx="minor">
+            <a:schemeClr val="tx1"/>
+          </a:fontRef>
+        </p:style>
+      </p:cxnSp>
+      <p:cxnSp>
+        <p:nvCxnSpPr>
+          <p:cNvPr id="33" name="Connecteur droit 32"/>
+          <p:cNvCxnSpPr/>
+          <p:nvPr/>
+        </p:nvCxnSpPr>
+        <p:spPr>
+          <a:xfrm rot="5400000" flipH="1" flipV="1">
+            <a:off x="2660650" y="4140200"/>
+            <a:ext cx="44450" cy="44450"/>
+          </a:xfrm>
+          <a:prstGeom prst="line">
+            <a:avLst/>
+          </a:prstGeom>
+          <a:ln w="9525">
+            <a:solidFill>
+              <a:srgbClr val="00B050"/>
+            </a:solidFill>
+          </a:ln>
+        </p:spPr>
+        <p:style>
+          <a:lnRef idx="1">
+            <a:schemeClr val="accent1"/>
+          </a:lnRef>
+          <a:fillRef idx="0">
+            <a:schemeClr val="accent1"/>
+          </a:fillRef>
+          <a:effectRef idx="0">
+            <a:schemeClr val="accent1"/>
+          </a:effectRef>
+          <a:fontRef idx="minor">
+            <a:schemeClr val="tx1"/>
+          </a:fontRef>
+        </p:style>
+      </p:cxnSp>
+      <p:cxnSp>
+        <p:nvCxnSpPr>
+          <p:cNvPr id="34" name="Connecteur droit 33"/>
+          <p:cNvCxnSpPr/>
+          <p:nvPr/>
+        </p:nvCxnSpPr>
+        <p:spPr>
+          <a:xfrm rot="5400000" flipH="1" flipV="1">
+            <a:off x="2705100" y="4140200"/>
+            <a:ext cx="44450" cy="44450"/>
+          </a:xfrm>
+          <a:prstGeom prst="line">
+            <a:avLst/>
+          </a:prstGeom>
+          <a:ln w="9525">
+            <a:solidFill>
+              <a:srgbClr val="00B050"/>
+            </a:solidFill>
+          </a:ln>
+        </p:spPr>
+        <p:style>
+          <a:lnRef idx="1">
+            <a:schemeClr val="accent1"/>
+          </a:lnRef>
+          <a:fillRef idx="0">
+            <a:schemeClr val="accent1"/>
+          </a:fillRef>
+          <a:effectRef idx="0">
+            <a:schemeClr val="accent1"/>
+          </a:effectRef>
+          <a:fontRef idx="minor">
+            <a:schemeClr val="tx1"/>
+          </a:fontRef>
+        </p:style>
+      </p:cxnSp>
+      <p:cxnSp>
+        <p:nvCxnSpPr>
+          <p:cNvPr id="35" name="Connecteur droit 34"/>
+          <p:cNvCxnSpPr/>
+          <p:nvPr/>
+        </p:nvCxnSpPr>
+        <p:spPr>
+          <a:xfrm rot="5400000">
+            <a:off x="2609911" y="3390843"/>
+            <a:ext cx="590430" cy="488949"/>
+          </a:xfrm>
+          <a:prstGeom prst="line">
+            <a:avLst/>
+          </a:prstGeom>
+          <a:ln w="19050">
+            <a:solidFill>
+              <a:srgbClr val="0070C0"/>
+            </a:solidFill>
+          </a:ln>
+        </p:spPr>
+        <p:style>
+          <a:lnRef idx="1">
+            <a:schemeClr val="accent1"/>
+          </a:lnRef>
+          <a:fillRef idx="0">
+            <a:schemeClr val="accent1"/>
+          </a:fillRef>
+          <a:effectRef idx="0">
+            <a:schemeClr val="accent1"/>
+          </a:effectRef>
+          <a:fontRef idx="minor">
+            <a:schemeClr val="tx1"/>
+          </a:fontRef>
+        </p:style>
+      </p:cxnSp>
+      <p:cxnSp>
+        <p:nvCxnSpPr>
+          <p:cNvPr id="40" name="Connecteur droit 39"/>
+          <p:cNvCxnSpPr/>
+          <p:nvPr/>
+        </p:nvCxnSpPr>
+        <p:spPr>
+          <a:xfrm rot="5400000">
+            <a:off x="2193928" y="3406778"/>
+            <a:ext cx="977899" cy="44446"/>
+          </a:xfrm>
+          <a:prstGeom prst="line">
+            <a:avLst/>
+          </a:prstGeom>
+          <a:ln w="9525">
+            <a:solidFill>
+              <a:srgbClr val="0070C0"/>
+            </a:solidFill>
+            <a:prstDash val="dash"/>
+          </a:ln>
+        </p:spPr>
+        <p:style>
+          <a:lnRef idx="1">
+            <a:schemeClr val="accent1"/>
+          </a:lnRef>
+          <a:fillRef idx="0">
+            <a:schemeClr val="accent1"/>
+          </a:fillRef>
+          <a:effectRef idx="0">
+            <a:schemeClr val="accent1"/>
+          </a:effectRef>
+          <a:fontRef idx="minor">
+            <a:schemeClr val="tx1"/>
+          </a:fontRef>
+        </p:style>
+      </p:cxnSp>
+      <p:cxnSp>
+        <p:nvCxnSpPr>
+          <p:cNvPr id="43" name="Connecteur droit 42"/>
+          <p:cNvCxnSpPr/>
+          <p:nvPr/>
+        </p:nvCxnSpPr>
+        <p:spPr>
+          <a:xfrm rot="10800000">
+            <a:off x="2705101" y="2984501"/>
+            <a:ext cx="444507" cy="355607"/>
+          </a:xfrm>
+          <a:prstGeom prst="line">
+            <a:avLst/>
+          </a:prstGeom>
+          <a:ln w="19050">
+            <a:solidFill>
+              <a:srgbClr val="FF0000"/>
+            </a:solidFill>
+            <a:tailEnd type="stealth" w="med" len="lg"/>
+          </a:ln>
+        </p:spPr>
+        <p:style>
+          <a:lnRef idx="1">
+            <a:schemeClr val="accent1"/>
+          </a:lnRef>
+          <a:fillRef idx="0">
+            <a:schemeClr val="accent1"/>
+          </a:fillRef>
+          <a:effectRef idx="0">
+            <a:schemeClr val="accent1"/>
+          </a:effectRef>
+          <a:fontRef idx="minor">
+            <a:schemeClr val="tx1"/>
+          </a:fontRef>
+        </p:style>
+      </p:cxnSp>
+      <p:sp>
+        <p:nvSpPr>
+          <p:cNvPr id="51" name="ZoneTexte 50"/>
+          <p:cNvSpPr txBox="1"/>
+          <p:nvPr/>
+        </p:nvSpPr>
+        <p:spPr>
+          <a:xfrm>
+            <a:off x="3105150" y="3251200"/>
+            <a:ext cx="266420" cy="261610"/>
+          </a:xfrm>
+          <a:prstGeom prst="rect">
+            <a:avLst/>
+          </a:prstGeom>
+          <a:noFill/>
+        </p:spPr>
+        <p:txBody>
+          <a:bodyPr wrap="none" rtlCol="0">
+            <a:spAutoFit/>
+          </a:bodyPr>
+          <a:lstStyle/>
+          <a:p>
+            <a:r>
+              <a:rPr lang="fr-FR" sz="1050" dirty="0" smtClean="0"/>
+              <a:t>A</a:t>
+            </a:r>
+            <a:endParaRPr lang="fr-FR" dirty="0"/>
+          </a:p>
+        </p:txBody>
+      </p:sp>
+      <p:sp>
+        <p:nvSpPr>
+          <p:cNvPr id="52" name="ZoneTexte 51"/>
+          <p:cNvSpPr txBox="1"/>
+          <p:nvPr/>
+        </p:nvSpPr>
+        <p:spPr>
+          <a:xfrm>
+            <a:off x="2971800" y="3429000"/>
+            <a:ext cx="258404" cy="253916"/>
+          </a:xfrm>
+          <a:prstGeom prst="rect">
+            <a:avLst/>
+          </a:prstGeom>
+          <a:noFill/>
+        </p:spPr>
+        <p:txBody>
+          <a:bodyPr wrap="none" rtlCol="0">
+            <a:spAutoFit/>
+          </a:bodyPr>
+          <a:lstStyle/>
+          <a:p>
+            <a:r>
+              <a:rPr lang="fr-FR" sz="1050" dirty="0" smtClean="0"/>
+              <a:t>B</a:t>
+            </a:r>
+            <a:endParaRPr lang="fr-FR" dirty="0"/>
+          </a:p>
+        </p:txBody>
+      </p:sp>
+      <p:sp>
+        <p:nvSpPr>
+          <p:cNvPr id="53" name="ZoneTexte 52"/>
+          <p:cNvSpPr txBox="1"/>
+          <p:nvPr/>
+        </p:nvSpPr>
+        <p:spPr>
+          <a:xfrm>
+            <a:off x="2794000" y="3606800"/>
+            <a:ext cx="256802" cy="253916"/>
+          </a:xfrm>
+          <a:prstGeom prst="rect">
+            <a:avLst/>
+          </a:prstGeom>
+          <a:noFill/>
+        </p:spPr>
+        <p:txBody>
+          <a:bodyPr wrap="none" rtlCol="0">
+            <a:spAutoFit/>
+          </a:bodyPr>
+          <a:lstStyle/>
+          <a:p>
+            <a:r>
+              <a:rPr lang="fr-FR" sz="1050" dirty="0" smtClean="0"/>
+              <a:t>C</a:t>
+            </a:r>
+            <a:endParaRPr lang="fr-FR" dirty="0"/>
+          </a:p>
+        </p:txBody>
+      </p:sp>
+      <p:graphicFrame>
+        <p:nvGraphicFramePr>
+          <p:cNvPr id="55" name="Objet 54"/>
+          <p:cNvGraphicFramePr>
+            <a:graphicFrameLocks noChangeAspect="1"/>
+          </p:cNvGraphicFramePr>
+          <p:nvPr/>
+        </p:nvGraphicFramePr>
+        <p:xfrm>
+          <a:off x="2482850" y="2806700"/>
+          <a:ext cx="203200" cy="254000"/>
+        </p:xfrm>
+        <a:graphic>
+          <a:graphicData uri="http://schemas.openxmlformats.org/presentationml/2006/ole">
+            <p:oleObj spid="_x0000_s1026" name="Équation" r:id="rId3" imgW="203040" imgH="253800" progId="Equation.3">
+              <p:embed/>
+            </p:oleObj>
+          </a:graphicData>
+        </a:graphic>
+      </p:graphicFrame>
+      <p:graphicFrame>
+        <p:nvGraphicFramePr>
+          <p:cNvPr id="56" name="Objet 55"/>
+          <p:cNvGraphicFramePr>
+            <a:graphicFrameLocks noChangeAspect="1"/>
+          </p:cNvGraphicFramePr>
+          <p:nvPr/>
+        </p:nvGraphicFramePr>
+        <p:xfrm>
+          <a:off x="2482850" y="3073400"/>
+          <a:ext cx="203200" cy="254000"/>
+        </p:xfrm>
+        <a:graphic>
+          <a:graphicData uri="http://schemas.openxmlformats.org/presentationml/2006/ole">
+            <p:oleObj spid="_x0000_s1027" name="Équation" r:id="rId4" imgW="203040" imgH="253800" progId="Equation.3">
+              <p:embed/>
+            </p:oleObj>
+          </a:graphicData>
+        </a:graphic>
+      </p:graphicFrame>
+      <p:graphicFrame>
+        <p:nvGraphicFramePr>
+          <p:cNvPr id="57" name="Objet 56"/>
+          <p:cNvGraphicFramePr>
+            <a:graphicFrameLocks noChangeAspect="1"/>
+          </p:cNvGraphicFramePr>
+          <p:nvPr/>
+        </p:nvGraphicFramePr>
+        <p:xfrm>
+          <a:off x="2482850" y="3340100"/>
+          <a:ext cx="203200" cy="266700"/>
+        </p:xfrm>
+        <a:graphic>
+          <a:graphicData uri="http://schemas.openxmlformats.org/presentationml/2006/ole">
+            <p:oleObj spid="_x0000_s1028" name="Équation" r:id="rId5" imgW="203040" imgH="266400" progId="Equation.3">
+              <p:embed/>
+            </p:oleObj>
+          </a:graphicData>
+        </a:graphic>
+      </p:graphicFrame>
+      <p:cxnSp>
+        <p:nvCxnSpPr>
+          <p:cNvPr id="62" name="Connecteur droit 61"/>
+          <p:cNvCxnSpPr/>
+          <p:nvPr/>
+        </p:nvCxnSpPr>
+        <p:spPr>
+          <a:xfrm rot="10800000">
+            <a:off x="2682876" y="3251200"/>
+            <a:ext cx="333383" cy="266708"/>
+          </a:xfrm>
+          <a:prstGeom prst="line">
+            <a:avLst/>
+          </a:prstGeom>
+          <a:ln w="19050">
+            <a:solidFill>
+              <a:srgbClr val="FF0000"/>
+            </a:solidFill>
+            <a:tailEnd type="stealth" w="med" len="lg"/>
+          </a:ln>
+        </p:spPr>
+        <p:style>
+          <a:lnRef idx="1">
+            <a:schemeClr val="accent1"/>
+          </a:lnRef>
+          <a:fillRef idx="0">
+            <a:schemeClr val="accent1"/>
+          </a:fillRef>
+          <a:effectRef idx="0">
+            <a:schemeClr val="accent1"/>
+          </a:effectRef>
+          <a:fontRef idx="minor">
+            <a:schemeClr val="tx1"/>
+          </a:fontRef>
+        </p:style>
+      </p:cxnSp>
+      <p:cxnSp>
+        <p:nvCxnSpPr>
+          <p:cNvPr id="63" name="Connecteur droit 62"/>
+          <p:cNvCxnSpPr/>
+          <p:nvPr/>
+        </p:nvCxnSpPr>
+        <p:spPr>
+          <a:xfrm rot="10800000">
+            <a:off x="2660651" y="3517901"/>
+            <a:ext cx="222257" cy="177807"/>
+          </a:xfrm>
+          <a:prstGeom prst="line">
+            <a:avLst/>
+          </a:prstGeom>
+          <a:ln w="19050">
+            <a:solidFill>
+              <a:srgbClr val="FF0000"/>
+            </a:solidFill>
+            <a:tailEnd type="stealth" w="med" len="lg"/>
+          </a:ln>
+        </p:spPr>
+        <p:style>
+          <a:lnRef idx="1">
+            <a:schemeClr val="accent1"/>
+          </a:lnRef>
+          <a:fillRef idx="0">
+            <a:schemeClr val="accent1"/>
+          </a:fillRef>
+          <a:effectRef idx="0">
+            <a:schemeClr val="accent1"/>
+          </a:effectRef>
+          <a:fontRef idx="minor">
+            <a:schemeClr val="tx1"/>
+          </a:fontRef>
+        </p:style>
+      </p:cxnSp>
+      <p:cxnSp>
+        <p:nvCxnSpPr>
+          <p:cNvPr id="68" name="Connecteur droit 67"/>
+          <p:cNvCxnSpPr/>
+          <p:nvPr/>
+        </p:nvCxnSpPr>
+        <p:spPr>
+          <a:xfrm rot="5400000" flipH="1" flipV="1">
+            <a:off x="882650" y="4140200"/>
+            <a:ext cx="44450" cy="44450"/>
+          </a:xfrm>
+          <a:prstGeom prst="line">
+            <a:avLst/>
+          </a:prstGeom>
+          <a:ln w="9525">
+            <a:solidFill>
+              <a:srgbClr val="00B050"/>
+            </a:solidFill>
+          </a:ln>
+        </p:spPr>
+        <p:style>
+          <a:lnRef idx="1">
+            <a:schemeClr val="accent1"/>
+          </a:lnRef>
+          <a:fillRef idx="0">
+            <a:schemeClr val="accent1"/>
+          </a:fillRef>
+          <a:effectRef idx="0">
+            <a:schemeClr val="accent1"/>
+          </a:effectRef>
+          <a:fontRef idx="minor">
+            <a:schemeClr val="tx1"/>
+          </a:fontRef>
+        </p:style>
+      </p:cxnSp>
+      <p:cxnSp>
+        <p:nvCxnSpPr>
+          <p:cNvPr id="69" name="Connecteur droit 68"/>
+          <p:cNvCxnSpPr/>
+          <p:nvPr/>
+        </p:nvCxnSpPr>
+        <p:spPr>
+          <a:xfrm>
+            <a:off x="882650" y="4140200"/>
+            <a:ext cx="177800" cy="1588"/>
+          </a:xfrm>
+          <a:prstGeom prst="line">
+            <a:avLst/>
+          </a:prstGeom>
+          <a:ln w="19050">
+            <a:solidFill>
+              <a:srgbClr val="00B050"/>
+            </a:solidFill>
+          </a:ln>
+        </p:spPr>
+        <p:style>
+          <a:lnRef idx="1">
+            <a:schemeClr val="accent1"/>
+          </a:lnRef>
+          <a:fillRef idx="0">
+            <a:schemeClr val="accent1"/>
+          </a:fillRef>
+          <a:effectRef idx="0">
+            <a:schemeClr val="accent1"/>
+          </a:effectRef>
+          <a:fontRef idx="minor">
+            <a:schemeClr val="tx1"/>
+          </a:fontRef>
+        </p:style>
+      </p:cxnSp>
+      <p:cxnSp>
+        <p:nvCxnSpPr>
+          <p:cNvPr id="70" name="Connecteur droit 69"/>
+          <p:cNvCxnSpPr/>
+          <p:nvPr/>
+        </p:nvCxnSpPr>
+        <p:spPr>
+          <a:xfrm rot="5400000" flipH="1" flipV="1">
+            <a:off x="906525" y="4071875"/>
+            <a:ext cx="131150" cy="1100"/>
+          </a:xfrm>
+          <a:prstGeom prst="line">
+            <a:avLst/>
+          </a:prstGeom>
+          <a:ln w="19050">
+            <a:solidFill>
+              <a:srgbClr val="00B050"/>
+            </a:solidFill>
+          </a:ln>
+        </p:spPr>
+        <p:style>
+          <a:lnRef idx="1">
+            <a:schemeClr val="accent1"/>
+          </a:lnRef>
+          <a:fillRef idx="0">
+            <a:schemeClr val="accent1"/>
+          </a:fillRef>
+          <a:effectRef idx="0">
+            <a:schemeClr val="accent1"/>
+          </a:effectRef>
+          <a:fontRef idx="minor">
+            <a:schemeClr val="tx1"/>
+          </a:fontRef>
+        </p:style>
+      </p:cxnSp>
+      <p:cxnSp>
+        <p:nvCxnSpPr>
+          <p:cNvPr id="71" name="Connecteur droit 70"/>
+          <p:cNvCxnSpPr/>
+          <p:nvPr/>
+        </p:nvCxnSpPr>
+        <p:spPr>
+          <a:xfrm rot="5400000" flipH="1" flipV="1">
+            <a:off x="927100" y="4140200"/>
+            <a:ext cx="44450" cy="44450"/>
+          </a:xfrm>
+          <a:prstGeom prst="line">
+            <a:avLst/>
+          </a:prstGeom>
+          <a:ln w="9525">
+            <a:solidFill>
+              <a:srgbClr val="00B050"/>
+            </a:solidFill>
+          </a:ln>
+        </p:spPr>
+        <p:style>
+          <a:lnRef idx="1">
+            <a:schemeClr val="accent1"/>
+          </a:lnRef>
+          <a:fillRef idx="0">
+            <a:schemeClr val="accent1"/>
+          </a:fillRef>
+          <a:effectRef idx="0">
+            <a:schemeClr val="accent1"/>
+          </a:effectRef>
+          <a:fontRef idx="minor">
+            <a:schemeClr val="tx1"/>
+          </a:fontRef>
+        </p:style>
+      </p:cxnSp>
+      <p:cxnSp>
+        <p:nvCxnSpPr>
+          <p:cNvPr id="72" name="Connecteur droit 71"/>
+          <p:cNvCxnSpPr/>
+          <p:nvPr/>
+        </p:nvCxnSpPr>
+        <p:spPr>
+          <a:xfrm rot="5400000" flipH="1" flipV="1">
+            <a:off x="971550" y="4140200"/>
+            <a:ext cx="44450" cy="44450"/>
+          </a:xfrm>
+          <a:prstGeom prst="line">
+            <a:avLst/>
+          </a:prstGeom>
+          <a:ln w="9525">
+            <a:solidFill>
+              <a:srgbClr val="00B050"/>
+            </a:solidFill>
+          </a:ln>
+        </p:spPr>
+        <p:style>
+          <a:lnRef idx="1">
+            <a:schemeClr val="accent1"/>
+          </a:lnRef>
+          <a:fillRef idx="0">
+            <a:schemeClr val="accent1"/>
+          </a:fillRef>
+          <a:effectRef idx="0">
+            <a:schemeClr val="accent1"/>
+          </a:effectRef>
+          <a:fontRef idx="minor">
+            <a:schemeClr val="tx1"/>
+          </a:fontRef>
+        </p:style>
+      </p:cxnSp>
+      <p:cxnSp>
+        <p:nvCxnSpPr>
+          <p:cNvPr id="73" name="Connecteur droit 72"/>
+          <p:cNvCxnSpPr/>
+          <p:nvPr/>
+        </p:nvCxnSpPr>
+        <p:spPr>
+          <a:xfrm rot="5400000" flipH="1" flipV="1">
+            <a:off x="1016000" y="4140200"/>
+            <a:ext cx="44450" cy="44450"/>
+          </a:xfrm>
+          <a:prstGeom prst="line">
+            <a:avLst/>
+          </a:prstGeom>
+          <a:ln w="9525">
+            <a:solidFill>
+              <a:srgbClr val="00B050"/>
+            </a:solidFill>
+          </a:ln>
+        </p:spPr>
+        <p:style>
+          <a:lnRef idx="1">
+            <a:schemeClr val="accent1"/>
+          </a:lnRef>
+          <a:fillRef idx="0">
+            <a:schemeClr val="accent1"/>
+          </a:fillRef>
+          <a:effectRef idx="0">
+            <a:schemeClr val="accent1"/>
+          </a:effectRef>
+          <a:fontRef idx="minor">
+            <a:schemeClr val="tx1"/>
+          </a:fontRef>
+        </p:style>
+      </p:cxnSp>
+      <p:sp>
+        <p:nvSpPr>
+          <p:cNvPr id="75" name="Rectangle 74"/>
+          <p:cNvSpPr/>
+          <p:nvPr/>
+        </p:nvSpPr>
+        <p:spPr>
+          <a:xfrm>
+            <a:off x="838200" y="3873500"/>
+            <a:ext cx="266700" cy="133350"/>
+          </a:xfrm>
+          <a:prstGeom prst="rect">
+            <a:avLst/>
+          </a:prstGeom>
+          <a:noFill/>
+          <a:ln w="12700">
+            <a:solidFill>
+              <a:srgbClr val="00B050"/>
+            </a:solidFill>
+          </a:ln>
+        </p:spPr>
+        <p:style>
+          <a:lnRef idx="2">
+            <a:schemeClr val="accent1">
+              <a:shade val="50000"/>
+            </a:schemeClr>
+          </a:lnRef>
+          <a:fillRef idx="1">
+            <a:schemeClr val="accent1"/>
+          </a:fillRef>
+          <a:effectRef idx="0">
+            <a:schemeClr val="accent1"/>
+          </a:effectRef>
+          <a:fontRef idx="minor">
+            <a:schemeClr val="lt1"/>
+          </a:fontRef>
+        </p:style>
+        <p:txBody>
+          <a:bodyPr rtlCol="0" anchor="ctr"/>
+          <a:lstStyle/>
+          <a:p>
+            <a:pPr algn="ctr"/>
+            <a:endParaRPr lang="fr-FR"/>
+          </a:p>
+        </p:txBody>
+      </p:sp>
+      <p:cxnSp>
+        <p:nvCxnSpPr>
+          <p:cNvPr id="76" name="Connecteur droit 75"/>
+          <p:cNvCxnSpPr/>
+          <p:nvPr/>
+        </p:nvCxnSpPr>
+        <p:spPr>
+          <a:xfrm rot="10800000" flipV="1">
+            <a:off x="1104900" y="3946522"/>
+            <a:ext cx="222250" cy="0"/>
+          </a:xfrm>
+          <a:prstGeom prst="line">
+            <a:avLst/>
+          </a:prstGeom>
+          <a:ln w="19050">
+            <a:solidFill>
+              <a:srgbClr val="0070C0"/>
+            </a:solidFill>
+          </a:ln>
+        </p:spPr>
+        <p:style>
+          <a:lnRef idx="1">
+            <a:schemeClr val="accent1"/>
+          </a:lnRef>
+          <a:fillRef idx="0">
+            <a:schemeClr val="accent1"/>
+          </a:fillRef>
+          <a:effectRef idx="0">
+            <a:schemeClr val="accent1"/>
+          </a:effectRef>
+          <a:fontRef idx="minor">
+            <a:schemeClr val="tx1"/>
+          </a:fontRef>
+        </p:style>
+      </p:cxnSp>
+      <p:cxnSp>
+        <p:nvCxnSpPr>
+          <p:cNvPr id="79" name="Connecteur droit 78"/>
+          <p:cNvCxnSpPr/>
+          <p:nvPr/>
+        </p:nvCxnSpPr>
+        <p:spPr>
+          <a:xfrm rot="5400000" flipH="1" flipV="1">
+            <a:off x="936230" y="3553220"/>
+            <a:ext cx="781842" cy="2"/>
+          </a:xfrm>
+          <a:prstGeom prst="line">
+            <a:avLst/>
+          </a:prstGeom>
+          <a:ln w="19050">
+            <a:solidFill>
+              <a:srgbClr val="0070C0"/>
+            </a:solidFill>
+          </a:ln>
+        </p:spPr>
+        <p:style>
+          <a:lnRef idx="1">
+            <a:schemeClr val="accent1"/>
+          </a:lnRef>
+          <a:fillRef idx="0">
+            <a:schemeClr val="accent1"/>
+          </a:fillRef>
+          <a:effectRef idx="0">
+            <a:schemeClr val="accent1"/>
+          </a:effectRef>
+          <a:fontRef idx="minor">
+            <a:schemeClr val="tx1"/>
+          </a:fontRef>
+        </p:style>
+      </p:cxnSp>
+      <p:cxnSp>
+        <p:nvCxnSpPr>
+          <p:cNvPr id="83" name="Connecteur droit 82"/>
+          <p:cNvCxnSpPr/>
+          <p:nvPr/>
+        </p:nvCxnSpPr>
+        <p:spPr>
+          <a:xfrm rot="10800000">
+            <a:off x="882650" y="3206750"/>
+            <a:ext cx="444502" cy="2"/>
+          </a:xfrm>
+          <a:prstGeom prst="line">
+            <a:avLst/>
+          </a:prstGeom>
+          <a:ln w="19050">
+            <a:solidFill>
+              <a:srgbClr val="FF0000"/>
+            </a:solidFill>
+            <a:tailEnd type="stealth" w="med" len="lg"/>
+          </a:ln>
+        </p:spPr>
+        <p:style>
+          <a:lnRef idx="1">
+            <a:schemeClr val="accent1"/>
+          </a:lnRef>
+          <a:fillRef idx="0">
+            <a:schemeClr val="accent1"/>
+          </a:fillRef>
+          <a:effectRef idx="0">
+            <a:schemeClr val="accent1"/>
+          </a:effectRef>
+          <a:fontRef idx="minor">
+            <a:schemeClr val="tx1"/>
+          </a:fontRef>
+        </p:style>
+      </p:cxnSp>
+      <p:cxnSp>
+        <p:nvCxnSpPr>
+          <p:cNvPr id="86" name="Connecteur droit 85"/>
+          <p:cNvCxnSpPr/>
+          <p:nvPr/>
+        </p:nvCxnSpPr>
+        <p:spPr>
+          <a:xfrm rot="10800000">
+            <a:off x="882650" y="3429000"/>
+            <a:ext cx="444502" cy="2"/>
+          </a:xfrm>
+          <a:prstGeom prst="line">
+            <a:avLst/>
+          </a:prstGeom>
+          <a:ln w="19050">
+            <a:solidFill>
+              <a:srgbClr val="FF0000"/>
+            </a:solidFill>
+            <a:tailEnd type="stealth" w="med" len="lg"/>
+          </a:ln>
+        </p:spPr>
+        <p:style>
+          <a:lnRef idx="1">
+            <a:schemeClr val="accent1"/>
+          </a:lnRef>
+          <a:fillRef idx="0">
+            <a:schemeClr val="accent1"/>
+          </a:fillRef>
+          <a:effectRef idx="0">
+            <a:schemeClr val="accent1"/>
+          </a:effectRef>
+          <a:fontRef idx="minor">
+            <a:schemeClr val="tx1"/>
+          </a:fontRef>
+        </p:style>
+      </p:cxnSp>
+      <p:cxnSp>
+        <p:nvCxnSpPr>
+          <p:cNvPr id="87" name="Connecteur droit 86"/>
+          <p:cNvCxnSpPr/>
+          <p:nvPr/>
+        </p:nvCxnSpPr>
+        <p:spPr>
+          <a:xfrm rot="10800000">
+            <a:off x="882650" y="3651250"/>
+            <a:ext cx="444502" cy="2"/>
+          </a:xfrm>
+          <a:prstGeom prst="line">
+            <a:avLst/>
+          </a:prstGeom>
+          <a:ln w="19050">
+            <a:solidFill>
+              <a:srgbClr val="FF0000"/>
+            </a:solidFill>
+            <a:tailEnd type="stealth" w="med" len="lg"/>
+          </a:ln>
+        </p:spPr>
+        <p:style>
+          <a:lnRef idx="1">
+            <a:schemeClr val="accent1"/>
+          </a:lnRef>
+          <a:fillRef idx="0">
+            <a:schemeClr val="accent1"/>
+          </a:fillRef>
+          <a:effectRef idx="0">
+            <a:schemeClr val="accent1"/>
+          </a:effectRef>
+          <a:fontRef idx="minor">
+            <a:schemeClr val="tx1"/>
+          </a:fontRef>
+        </p:style>
+      </p:cxnSp>
+      <p:sp>
+        <p:nvSpPr>
+          <p:cNvPr id="88" name="ZoneTexte 87"/>
+          <p:cNvSpPr txBox="1"/>
+          <p:nvPr/>
+        </p:nvSpPr>
+        <p:spPr>
+          <a:xfrm>
+            <a:off x="1327150" y="3073400"/>
+            <a:ext cx="266420" cy="261610"/>
+          </a:xfrm>
+          <a:prstGeom prst="rect">
+            <a:avLst/>
+          </a:prstGeom>
+          <a:noFill/>
+        </p:spPr>
+        <p:txBody>
+          <a:bodyPr wrap="none" rtlCol="0">
+            <a:spAutoFit/>
+          </a:bodyPr>
+          <a:lstStyle/>
+          <a:p>
+            <a:r>
+              <a:rPr lang="fr-FR" sz="1050" dirty="0" smtClean="0"/>
+              <a:t>A</a:t>
+            </a:r>
+            <a:endParaRPr lang="fr-FR" dirty="0"/>
+          </a:p>
+        </p:txBody>
+      </p:sp>
+      <p:sp>
+        <p:nvSpPr>
+          <p:cNvPr id="89" name="ZoneTexte 88"/>
+          <p:cNvSpPr txBox="1"/>
+          <p:nvPr/>
+        </p:nvSpPr>
+        <p:spPr>
+          <a:xfrm>
+            <a:off x="1327150" y="3295650"/>
+            <a:ext cx="258404" cy="253916"/>
+          </a:xfrm>
+          <a:prstGeom prst="rect">
+            <a:avLst/>
+          </a:prstGeom>
+          <a:noFill/>
+        </p:spPr>
+        <p:txBody>
+          <a:bodyPr wrap="none" rtlCol="0">
+            <a:spAutoFit/>
+          </a:bodyPr>
+          <a:lstStyle/>
+          <a:p>
+            <a:r>
+              <a:rPr lang="fr-FR" sz="1050" dirty="0" smtClean="0"/>
+              <a:t>B</a:t>
+            </a:r>
+            <a:endParaRPr lang="fr-FR" dirty="0"/>
+          </a:p>
+        </p:txBody>
+      </p:sp>
+      <p:sp>
+        <p:nvSpPr>
+          <p:cNvPr id="90" name="ZoneTexte 89"/>
+          <p:cNvSpPr txBox="1"/>
+          <p:nvPr/>
+        </p:nvSpPr>
+        <p:spPr>
+          <a:xfrm>
+            <a:off x="1327150" y="3517900"/>
+            <a:ext cx="256802" cy="253916"/>
+          </a:xfrm>
+          <a:prstGeom prst="rect">
+            <a:avLst/>
+          </a:prstGeom>
+          <a:noFill/>
+        </p:spPr>
+        <p:txBody>
+          <a:bodyPr wrap="none" rtlCol="0">
+            <a:spAutoFit/>
+          </a:bodyPr>
+          <a:lstStyle/>
+          <a:p>
+            <a:r>
+              <a:rPr lang="fr-FR" sz="1050" dirty="0" smtClean="0"/>
+              <a:t>C</a:t>
+            </a:r>
+            <a:endParaRPr lang="fr-FR" dirty="0"/>
+          </a:p>
+        </p:txBody>
+      </p:sp>
+      <p:graphicFrame>
+        <p:nvGraphicFramePr>
+          <p:cNvPr id="91" name="Objet 90"/>
+          <p:cNvGraphicFramePr>
+            <a:graphicFrameLocks noChangeAspect="1"/>
+          </p:cNvGraphicFramePr>
+          <p:nvPr/>
+        </p:nvGraphicFramePr>
+        <p:xfrm>
+          <a:off x="704850" y="2984500"/>
+          <a:ext cx="203200" cy="254000"/>
+        </p:xfrm>
+        <a:graphic>
+          <a:graphicData uri="http://schemas.openxmlformats.org/presentationml/2006/ole">
+            <p:oleObj spid="_x0000_s1029" name="Équation" r:id="rId6" imgW="203040" imgH="253800" progId="Equation.3">
+              <p:embed/>
+            </p:oleObj>
+          </a:graphicData>
+        </a:graphic>
+      </p:graphicFrame>
+      <p:graphicFrame>
+        <p:nvGraphicFramePr>
+          <p:cNvPr id="94" name="Objet 93"/>
+          <p:cNvGraphicFramePr>
+            <a:graphicFrameLocks noChangeAspect="1"/>
+          </p:cNvGraphicFramePr>
+          <p:nvPr/>
+        </p:nvGraphicFramePr>
+        <p:xfrm>
+          <a:off x="704850" y="3206750"/>
+          <a:ext cx="203200" cy="254000"/>
+        </p:xfrm>
+        <a:graphic>
+          <a:graphicData uri="http://schemas.openxmlformats.org/presentationml/2006/ole">
+            <p:oleObj spid="_x0000_s1032" name="Équation" r:id="rId7" imgW="203040" imgH="253800" progId="Equation.3">
+              <p:embed/>
+            </p:oleObj>
+          </a:graphicData>
+        </a:graphic>
+      </p:graphicFrame>
+      <p:graphicFrame>
+        <p:nvGraphicFramePr>
+          <p:cNvPr id="95" name="Objet 94"/>
+          <p:cNvGraphicFramePr>
+            <a:graphicFrameLocks noChangeAspect="1"/>
+          </p:cNvGraphicFramePr>
+          <p:nvPr/>
+        </p:nvGraphicFramePr>
+        <p:xfrm>
+          <a:off x="704850" y="3473450"/>
+          <a:ext cx="203200" cy="266700"/>
+        </p:xfrm>
+        <a:graphic>
+          <a:graphicData uri="http://schemas.openxmlformats.org/presentationml/2006/ole">
+            <p:oleObj spid="_x0000_s1033" name="Équation" r:id="rId8" imgW="203040" imgH="266400" progId="Equation.3">
+              <p:embed/>
+            </p:oleObj>
+          </a:graphicData>
+        </a:graphic>
+      </p:graphicFrame>
+    </p:spTree>
+    <p:extLst>
+      <p:ext uri="{BB962C8B-B14F-4D97-AF65-F5344CB8AC3E}">
+        <p14:creationId xmlns:p14="http://schemas.microsoft.com/office/powerpoint/2010/main" xmlns="" val="422412008"/>
+      </p:ext>
+    </p:extLst>
+  </p:cSld>
+  <p:clrMapOvr>
+    <a:masterClrMapping/>
+  </p:clrMapOvr>
+</p:sld>
+</file>
+
+<file path=ppt/slides/slide12.xml><?xml version="1.0" encoding="utf-8"?>
+<p:sld xmlns:a="http://schemas.openxmlformats.org/drawingml/2006/main" xmlns:r="http://schemas.openxmlformats.org/officeDocument/2006/relationships" xmlns:p="http://schemas.openxmlformats.org/presentationml/2006/main">
+  <p:cSld>
+    <p:spTree>
+      <p:nvGrpSpPr>
+        <p:cNvPr id="1" name=""/>
+        <p:cNvGrpSpPr/>
+        <p:nvPr/>
+      </p:nvGrpSpPr>
+      <p:grpSpPr>
+        <a:xfrm>
+          <a:off x="0" y="0"/>
+          <a:ext cx="0" cy="0"/>
+          <a:chOff x="0" y="0"/>
+          <a:chExt cx="0" cy="0"/>
+        </a:xfrm>
+      </p:grpSpPr>
+      <p:cxnSp>
+        <p:nvCxnSpPr>
+          <p:cNvPr id="4" name="Connecteur droit 3"/>
+          <p:cNvCxnSpPr/>
+          <p:nvPr/>
+        </p:nvCxnSpPr>
+        <p:spPr>
+          <a:xfrm>
+            <a:off x="2216150" y="3429000"/>
+            <a:ext cx="2089150" cy="1588"/>
+          </a:xfrm>
+          <a:prstGeom prst="line">
+            <a:avLst/>
+          </a:prstGeom>
+          <a:ln w="19050">
+            <a:solidFill>
+              <a:srgbClr val="00B050"/>
+            </a:solidFill>
+          </a:ln>
+        </p:spPr>
+        <p:style>
+          <a:lnRef idx="1">
+            <a:schemeClr val="accent1"/>
+          </a:lnRef>
+          <a:fillRef idx="0">
+            <a:schemeClr val="accent1"/>
+          </a:fillRef>
+          <a:effectRef idx="0">
+            <a:schemeClr val="accent1"/>
+          </a:effectRef>
+          <a:fontRef idx="minor">
+            <a:schemeClr val="tx1"/>
+          </a:fontRef>
+        </p:style>
+      </p:cxnSp>
+      <p:cxnSp>
+        <p:nvCxnSpPr>
+          <p:cNvPr id="6" name="Connecteur droit avec flèche 5"/>
+          <p:cNvCxnSpPr/>
+          <p:nvPr/>
+        </p:nvCxnSpPr>
+        <p:spPr>
+          <a:xfrm flipV="1">
+            <a:off x="2349500" y="3162300"/>
+            <a:ext cx="755650" cy="266700"/>
+          </a:xfrm>
+          <a:prstGeom prst="straightConnector1">
+            <a:avLst/>
+          </a:prstGeom>
+          <a:ln w="28575">
+            <a:solidFill>
+              <a:srgbClr val="FF0000"/>
+            </a:solidFill>
+            <a:tailEnd type="stealth" w="med" len="lg"/>
+          </a:ln>
+        </p:spPr>
+        <p:style>
+          <a:lnRef idx="1">
+            <a:schemeClr val="accent1"/>
+          </a:lnRef>
+          <a:fillRef idx="0">
+            <a:schemeClr val="accent1"/>
+          </a:fillRef>
+          <a:effectRef idx="0">
+            <a:schemeClr val="accent1"/>
+          </a:effectRef>
+          <a:fontRef idx="minor">
+            <a:schemeClr val="tx1"/>
+          </a:fontRef>
+        </p:style>
+      </p:cxnSp>
+      <p:cxnSp>
+        <p:nvCxnSpPr>
+          <p:cNvPr id="16" name="Connecteur droit avec flèche 15"/>
+          <p:cNvCxnSpPr/>
+          <p:nvPr/>
+        </p:nvCxnSpPr>
+        <p:spPr>
+          <a:xfrm>
+            <a:off x="3371850" y="3429000"/>
+            <a:ext cx="755650" cy="205105"/>
+          </a:xfrm>
+          <a:prstGeom prst="straightConnector1">
+            <a:avLst/>
+          </a:prstGeom>
+          <a:ln w="28575">
+            <a:solidFill>
+              <a:srgbClr val="FF0000"/>
+            </a:solidFill>
+            <a:tailEnd type="stealth" w="med" len="lg"/>
+          </a:ln>
+        </p:spPr>
+        <p:style>
+          <a:lnRef idx="1">
+            <a:schemeClr val="accent1"/>
+          </a:lnRef>
+          <a:fillRef idx="0">
+            <a:schemeClr val="accent1"/>
+          </a:fillRef>
+          <a:effectRef idx="0">
+            <a:schemeClr val="accent1"/>
+          </a:effectRef>
+          <a:fontRef idx="minor">
+            <a:schemeClr val="tx1"/>
+          </a:fontRef>
+        </p:style>
+      </p:cxnSp>
+      <p:sp>
+        <p:nvSpPr>
+          <p:cNvPr id="19" name="ZoneTexte 18"/>
+          <p:cNvSpPr txBox="1"/>
+          <p:nvPr/>
+        </p:nvSpPr>
+        <p:spPr>
+          <a:xfrm>
+            <a:off x="2216150" y="3429000"/>
+            <a:ext cx="266420" cy="261610"/>
+          </a:xfrm>
+          <a:prstGeom prst="rect">
+            <a:avLst/>
+          </a:prstGeom>
+          <a:noFill/>
+        </p:spPr>
+        <p:txBody>
+          <a:bodyPr wrap="none" rtlCol="0">
+            <a:spAutoFit/>
+          </a:bodyPr>
+          <a:lstStyle/>
+          <a:p>
+            <a:r>
+              <a:rPr lang="fr-FR" sz="1050" dirty="0" smtClean="0"/>
+              <a:t>A</a:t>
+            </a:r>
+            <a:endParaRPr lang="fr-FR" dirty="0"/>
+          </a:p>
+        </p:txBody>
+      </p:sp>
+      <p:sp>
+        <p:nvSpPr>
+          <p:cNvPr id="20" name="ZoneTexte 19"/>
+          <p:cNvSpPr txBox="1"/>
+          <p:nvPr/>
+        </p:nvSpPr>
+        <p:spPr>
+          <a:xfrm>
+            <a:off x="3238500" y="3162300"/>
+            <a:ext cx="258404" cy="253916"/>
+          </a:xfrm>
+          <a:prstGeom prst="rect">
+            <a:avLst/>
+          </a:prstGeom>
+          <a:noFill/>
+        </p:spPr>
+        <p:txBody>
+          <a:bodyPr wrap="none" rtlCol="0">
+            <a:spAutoFit/>
+          </a:bodyPr>
+          <a:lstStyle/>
+          <a:p>
+            <a:r>
+              <a:rPr lang="fr-FR" sz="1050" dirty="0" smtClean="0"/>
+              <a:t>B</a:t>
+            </a:r>
+            <a:endParaRPr lang="fr-FR" dirty="0"/>
+          </a:p>
+        </p:txBody>
+      </p:sp>
+      <p:graphicFrame>
+        <p:nvGraphicFramePr>
+          <p:cNvPr id="21" name="Objet 20"/>
+          <p:cNvGraphicFramePr>
+            <a:graphicFrameLocks noChangeAspect="1"/>
+          </p:cNvGraphicFramePr>
+          <p:nvPr/>
+        </p:nvGraphicFramePr>
+        <p:xfrm>
+          <a:off x="2749550" y="2895600"/>
+          <a:ext cx="203200" cy="254000"/>
+        </p:xfrm>
+        <a:graphic>
+          <a:graphicData uri="http://schemas.openxmlformats.org/presentationml/2006/ole">
+            <p:oleObj spid="_x0000_s2050" name="Équation" r:id="rId3" imgW="203040" imgH="253800" progId="Equation.3">
+              <p:embed/>
+            </p:oleObj>
+          </a:graphicData>
+        </a:graphic>
+      </p:graphicFrame>
+      <p:graphicFrame>
+        <p:nvGraphicFramePr>
+          <p:cNvPr id="22" name="Objet 21"/>
+          <p:cNvGraphicFramePr>
+            <a:graphicFrameLocks noChangeAspect="1"/>
+          </p:cNvGraphicFramePr>
+          <p:nvPr/>
+        </p:nvGraphicFramePr>
+        <p:xfrm>
+          <a:off x="3905250" y="3695700"/>
+          <a:ext cx="203200" cy="254000"/>
+        </p:xfrm>
+        <a:graphic>
+          <a:graphicData uri="http://schemas.openxmlformats.org/presentationml/2006/ole">
+            <p:oleObj spid="_x0000_s2051" name="Équation" r:id="rId4" imgW="203040" imgH="253800" progId="Equation.3">
+              <p:embed/>
+            </p:oleObj>
+          </a:graphicData>
+        </a:graphic>
+      </p:graphicFrame>
+    </p:spTree>
+  </p:cSld>
+  <p:clrMapOvr>
+    <a:masterClrMapping/>
+  </p:clrMapOvr>
+</p:sld>
+</file>
+
+<file path=ppt/slides/slide13.xml><?xml version="1.0" encoding="utf-8"?>
 <p:sld xmlns:a="http://schemas.openxmlformats.org/drawingml/2006/main" xmlns:r="http://schemas.openxmlformats.org/officeDocument/2006/relationships" xmlns:p="http://schemas.openxmlformats.org/presentationml/2006/main">
   <p:cSld>
     <p:spTree>
@@ -5049,77 +6560,35 @@
           </a:p>
         </p:txBody>
       </p:sp>
-      <p:cxnSp>
-        <p:nvCxnSpPr>
-          <p:cNvPr id="4" name="Connecteur droit 3"/>
-          <p:cNvCxnSpPr/>
-          <p:nvPr/>
-        </p:nvCxnSpPr>
-        <p:spPr>
-          <a:xfrm>
-            <a:off x="2411760" y="1988840"/>
-            <a:ext cx="0" cy="360040"/>
-          </a:xfrm>
-          <a:prstGeom prst="line">
-            <a:avLst/>
-          </a:prstGeom>
-          <a:ln w="28575"/>
-        </p:spPr>
-        <p:style>
-          <a:lnRef idx="1">
-            <a:schemeClr val="accent1"/>
-          </a:lnRef>
-          <a:fillRef idx="0">
-            <a:schemeClr val="accent1"/>
-          </a:fillRef>
-          <a:effectRef idx="0">
-            <a:schemeClr val="accent1"/>
-          </a:effectRef>
-          <a:fontRef idx="minor">
-            <a:schemeClr val="tx1"/>
-          </a:fontRef>
-        </p:style>
-      </p:cxnSp>
       <p:sp>
         <p:nvSpPr>
-          <p:cNvPr id="5" name="Rectangle 4"/>
+          <p:cNvPr id="3" name="Parallélogramme 2"/>
           <p:cNvSpPr/>
           <p:nvPr/>
         </p:nvSpPr>
         <p:spPr>
           <a:xfrm>
-            <a:off x="2195736" y="2348880"/>
-            <a:ext cx="432048" cy="216024"/>
+            <a:off x="3194050" y="3251200"/>
+            <a:ext cx="1866900" cy="889000"/>
           </a:xfrm>
-          <a:prstGeom prst="rect">
-            <a:avLst/>
+          <a:prstGeom prst="parallelogram">
+            <a:avLst>
+              <a:gd name="adj" fmla="val 77041"/>
+            </a:avLst>
           </a:prstGeom>
-          <a:pattFill prst="wdUpDiag">
-            <a:fgClr>
-              <a:schemeClr val="accent1"/>
-            </a:fgClr>
-            <a:bgClr>
-              <a:schemeClr val="bg1"/>
-            </a:bgClr>
-          </a:pattFill>
-          <a:ln>
-            <a:noFill/>
-          </a:ln>
         </p:spPr>
         <p:style>
-          <a:lnRef idx="2">
-            <a:schemeClr val="accent1">
-              <a:shade val="50000"/>
-            </a:schemeClr>
+          <a:lnRef idx="1">
+            <a:schemeClr val="accent1"/>
           </a:lnRef>
-          <a:fillRef idx="1">
+          <a:fillRef idx="2">
             <a:schemeClr val="accent1"/>
           </a:fillRef>
-          <a:effectRef idx="0">
+          <a:effectRef idx="1">
             <a:schemeClr val="accent1"/>
           </a:effectRef>
           <a:fontRef idx="minor">
-            <a:schemeClr val="lt1"/>
+            <a:schemeClr val="dk1"/>
           </a:fontRef>
         </p:style>
         <p:txBody>
@@ -5133,19 +6602,23 @@
       </p:sp>
       <p:cxnSp>
         <p:nvCxnSpPr>
-          <p:cNvPr id="6" name="Connecteur droit 5"/>
+          <p:cNvPr id="5" name="Connecteur droit 4"/>
           <p:cNvCxnSpPr/>
           <p:nvPr/>
         </p:nvCxnSpPr>
         <p:spPr>
-          <a:xfrm flipH="1">
-            <a:off x="2195736" y="2348880"/>
-            <a:ext cx="432048" cy="0"/>
+          <a:xfrm rot="5400000" flipH="1" flipV="1">
+            <a:off x="3771900" y="3162300"/>
+            <a:ext cx="1244600" cy="977900"/>
           </a:xfrm>
           <a:prstGeom prst="line">
             <a:avLst/>
           </a:prstGeom>
-          <a:ln w="28575"/>
+          <a:ln>
+            <a:solidFill>
+              <a:srgbClr val="0070C0"/>
+            </a:solidFill>
+          </a:ln>
         </p:spPr>
         <p:style>
           <a:lnRef idx="1">
@@ -5162,12 +6635,161 @@
           </a:fontRef>
         </p:style>
       </p:cxnSp>
+      <p:graphicFrame>
+        <p:nvGraphicFramePr>
+          <p:cNvPr id="3074" name="Object 2"/>
+          <p:cNvGraphicFramePr>
+            <a:graphicFrameLocks noChangeAspect="1"/>
+          </p:cNvGraphicFramePr>
+          <p:nvPr/>
+        </p:nvGraphicFramePr>
+        <p:xfrm>
+          <a:off x="4438650" y="3695700"/>
+          <a:ext cx="356235" cy="209550"/>
+        </p:xfrm>
+        <a:graphic>
+          <a:graphicData uri="http://schemas.openxmlformats.org/presentationml/2006/ole">
+            <p:oleObj spid="_x0000_s3074" name="Équation" r:id="rId3" imgW="431640" imgH="253800" progId="Equation.3">
+              <p:embed/>
+            </p:oleObj>
+          </a:graphicData>
+        </a:graphic>
+      </p:graphicFrame>
+      <p:cxnSp>
+        <p:nvCxnSpPr>
+          <p:cNvPr id="7" name="Connecteur droit 6"/>
+          <p:cNvCxnSpPr/>
+          <p:nvPr/>
+        </p:nvCxnSpPr>
+        <p:spPr>
+          <a:xfrm rot="5400000" flipH="1" flipV="1">
+            <a:off x="4189860" y="3434216"/>
+            <a:ext cx="463550" cy="364218"/>
+          </a:xfrm>
+          <a:prstGeom prst="line">
+            <a:avLst/>
+          </a:prstGeom>
+          <a:ln w="19050">
+            <a:solidFill>
+              <a:srgbClr val="002060"/>
+            </a:solidFill>
+            <a:tailEnd type="stealth" w="med" len="lg"/>
+          </a:ln>
+        </p:spPr>
+        <p:style>
+          <a:lnRef idx="1">
+            <a:schemeClr val="accent1"/>
+          </a:lnRef>
+          <a:fillRef idx="0">
+            <a:schemeClr val="accent1"/>
+          </a:fillRef>
+          <a:effectRef idx="0">
+            <a:schemeClr val="accent1"/>
+          </a:effectRef>
+          <a:fontRef idx="minor">
+            <a:schemeClr val="tx1"/>
+          </a:fontRef>
+        </p:style>
+      </p:cxnSp>
+      <p:sp>
+        <p:nvSpPr>
+          <p:cNvPr id="9" name="ZoneTexte 8"/>
+          <p:cNvSpPr txBox="1"/>
+          <p:nvPr/>
+        </p:nvSpPr>
+        <p:spPr>
+          <a:xfrm>
+            <a:off x="4171950" y="3829050"/>
+            <a:ext cx="300082" cy="253916"/>
+          </a:xfrm>
+          <a:prstGeom prst="rect">
+            <a:avLst/>
+          </a:prstGeom>
+          <a:noFill/>
+        </p:spPr>
+        <p:txBody>
+          <a:bodyPr wrap="none" rtlCol="0">
+            <a:spAutoFit/>
+          </a:bodyPr>
+          <a:lstStyle/>
+          <a:p>
+            <a:r>
+              <a:rPr lang="fr-FR" sz="1050" dirty="0" smtClean="0"/>
+              <a:t>M</a:t>
+            </a:r>
+            <a:endParaRPr lang="fr-FR" dirty="0"/>
+          </a:p>
+        </p:txBody>
+      </p:sp>
+      <p:cxnSp>
+        <p:nvCxnSpPr>
+          <p:cNvPr id="10" name="Connecteur droit 9"/>
+          <p:cNvCxnSpPr>
+            <a:endCxn id="9" idx="0"/>
+          </p:cNvCxnSpPr>
+          <p:nvPr/>
+        </p:nvCxnSpPr>
+        <p:spPr>
+          <a:xfrm flipV="1">
+            <a:off x="3638552" y="3829050"/>
+            <a:ext cx="683439" cy="133350"/>
+          </a:xfrm>
+          <a:prstGeom prst="line">
+            <a:avLst/>
+          </a:prstGeom>
+          <a:ln>
+            <a:solidFill>
+              <a:srgbClr val="0070C0"/>
+            </a:solidFill>
+            <a:prstDash val="dashDot"/>
+          </a:ln>
+        </p:spPr>
+        <p:style>
+          <a:lnRef idx="1">
+            <a:schemeClr val="accent1"/>
+          </a:lnRef>
+          <a:fillRef idx="0">
+            <a:schemeClr val="accent1"/>
+          </a:fillRef>
+          <a:effectRef idx="0">
+            <a:schemeClr val="accent1"/>
+          </a:effectRef>
+          <a:fontRef idx="minor">
+            <a:schemeClr val="tx1"/>
+          </a:fontRef>
+        </p:style>
+      </p:cxnSp>
+      <p:sp>
+        <p:nvSpPr>
+          <p:cNvPr id="13" name="ZoneTexte 12"/>
+          <p:cNvSpPr txBox="1"/>
+          <p:nvPr/>
+        </p:nvSpPr>
+        <p:spPr>
+          <a:xfrm>
+            <a:off x="3460750" y="3784600"/>
+            <a:ext cx="263214" cy="253916"/>
+          </a:xfrm>
+          <a:prstGeom prst="rect">
+            <a:avLst/>
+          </a:prstGeom>
+          <a:noFill/>
+        </p:spPr>
+        <p:txBody>
+          <a:bodyPr wrap="none" rtlCol="0">
+            <a:spAutoFit/>
+          </a:bodyPr>
+          <a:lstStyle/>
+          <a:p>
+            <a:r>
+              <a:rPr lang="fr-FR" sz="1050" dirty="0" smtClean="0"/>
+              <a:t>A</a:t>
+            </a:r>
+            <a:endParaRPr lang="fr-FR" dirty="0"/>
+          </a:p>
+        </p:txBody>
+      </p:sp>
     </p:spTree>
-    <p:extLst>
-      <p:ext uri="{BB962C8B-B14F-4D97-AF65-F5344CB8AC3E}">
-        <p14:creationId xmlns:p14="http://schemas.microsoft.com/office/powerpoint/2010/main" val="422412008"/>
-      </p:ext>
-    </p:extLst>
   </p:cSld>
   <p:clrMapOvr>
     <a:masterClrMapping/>
@@ -5204,7 +6826,7 @@
           <a:blip r:embed="rId2">
             <a:extLst>
               <a:ext uri="{28A0092B-C50C-407E-A947-70E740481C1C}">
-                <a14:useLocalDpi xmlns:a14="http://schemas.microsoft.com/office/drawing/2010/main" val="0"/>
+                <a14:useLocalDpi xmlns:a14="http://schemas.microsoft.com/office/drawing/2010/main" xmlns="" val="0"/>
               </a:ext>
             </a:extLst>
           </a:blip>
@@ -5228,14 +6850,14 @@
           <a:effectLst/>
           <a:extLst>
             <a:ext uri="{909E8E84-426E-40DD-AFC4-6F175D3DCCD1}">
-              <a14:hiddenFill xmlns:a14="http://schemas.microsoft.com/office/drawing/2010/main">
+              <a14:hiddenFill xmlns:a14="http://schemas.microsoft.com/office/drawing/2010/main" xmlns="">
                 <a:solidFill>
                   <a:schemeClr val="accent1"/>
                 </a:solidFill>
               </a14:hiddenFill>
             </a:ext>
             <a:ext uri="{91240B29-F687-4F45-9708-019B960494DF}">
-              <a14:hiddenLine xmlns:a14="http://schemas.microsoft.com/office/drawing/2010/main" w="9525">
+              <a14:hiddenLine xmlns:a14="http://schemas.microsoft.com/office/drawing/2010/main" xmlns="" w="9525">
                 <a:solidFill>
                   <a:schemeClr val="tx1"/>
                 </a:solidFill>
@@ -5245,7 +6867,7 @@
               </a14:hiddenLine>
             </a:ext>
             <a:ext uri="{AF507438-7753-43E0-B8FC-AC1667EBCBE1}">
-              <a14:hiddenEffects xmlns:a14="http://schemas.microsoft.com/office/drawing/2010/main">
+              <a14:hiddenEffects xmlns:a14="http://schemas.microsoft.com/office/drawing/2010/main" xmlns="">
                 <a:effectLst>
                   <a:outerShdw dist="35921" dir="2700000" algn="ctr" rotWithShape="0">
                     <a:schemeClr val="bg2"/>
@@ -5364,8 +6986,8 @@
           </a:fontRef>
         </p:style>
       </p:cxnSp>
-      <mc:AlternateContent xmlns:mc="http://schemas.openxmlformats.org/markup-compatibility/2006" xmlns:a14="http://schemas.microsoft.com/office/drawing/2010/main">
-        <mc:Choice Requires="a14">
+      <mc:AlternateContent xmlns:mc="http://schemas.openxmlformats.org/markup-compatibility/2006">
+        <mc:Choice xmlns:a14="http://schemas.microsoft.com/office/drawing/2010/main" xmlns="" Requires="a14">
           <p:sp>
             <p:nvSpPr>
               <p:cNvPr id="19" name="ZoneTexte 18"/>
@@ -5431,7 +7053,7 @@
             </p:txBody>
           </p:sp>
         </mc:Choice>
-        <mc:Fallback xmlns="">
+        <mc:Fallback>
           <p:sp>
             <p:nvSpPr>
               <p:cNvPr id="19" name="ZoneTexte 18"/>
@@ -5470,8 +7092,8 @@
           </p:sp>
         </mc:Fallback>
       </mc:AlternateContent>
-      <mc:AlternateContent xmlns:mc="http://schemas.openxmlformats.org/markup-compatibility/2006" xmlns:a14="http://schemas.microsoft.com/office/drawing/2010/main">
-        <mc:Choice Requires="a14">
+      <mc:AlternateContent xmlns:mc="http://schemas.openxmlformats.org/markup-compatibility/2006">
+        <mc:Choice xmlns:a14="http://schemas.microsoft.com/office/drawing/2010/main" xmlns="" Requires="a14">
           <p:sp>
             <p:nvSpPr>
               <p:cNvPr id="21" name="ZoneTexte 20"/>
@@ -5537,7 +7159,7 @@
             </p:txBody>
           </p:sp>
         </mc:Choice>
-        <mc:Fallback xmlns="">
+        <mc:Fallback>
           <p:sp>
             <p:nvSpPr>
               <p:cNvPr id="21" name="ZoneTexte 20"/>
@@ -5576,8 +7198,8 @@
           </p:sp>
         </mc:Fallback>
       </mc:AlternateContent>
-      <mc:AlternateContent xmlns:mc="http://schemas.openxmlformats.org/markup-compatibility/2006" xmlns:a14="http://schemas.microsoft.com/office/drawing/2010/main">
-        <mc:Choice Requires="a14">
+      <mc:AlternateContent xmlns:mc="http://schemas.openxmlformats.org/markup-compatibility/2006">
+        <mc:Choice xmlns:a14="http://schemas.microsoft.com/office/drawing/2010/main" xmlns="" Requires="a14">
           <p:sp>
             <p:nvSpPr>
               <p:cNvPr id="24" name="ZoneTexte 23"/>
@@ -5643,7 +7265,7 @@
             </p:txBody>
           </p:sp>
         </mc:Choice>
-        <mc:Fallback xmlns="">
+        <mc:Fallback>
           <p:sp>
             <p:nvSpPr>
               <p:cNvPr id="24" name="ZoneTexte 23"/>
@@ -5805,8 +7427,8 @@
           </a:p>
         </p:txBody>
       </p:sp>
-      <mc:AlternateContent xmlns:mc="http://schemas.openxmlformats.org/markup-compatibility/2006" xmlns:a14="http://schemas.microsoft.com/office/drawing/2010/main">
-        <mc:Choice Requires="a14">
+      <mc:AlternateContent xmlns:mc="http://schemas.openxmlformats.org/markup-compatibility/2006">
+        <mc:Choice xmlns:a14="http://schemas.microsoft.com/office/drawing/2010/main" xmlns="" Requires="a14">
           <p:sp>
             <p:nvSpPr>
               <p:cNvPr id="31" name="ZoneTexte 30"/>
@@ -5882,7 +7504,7 @@
             </p:txBody>
           </p:sp>
         </mc:Choice>
-        <mc:Fallback xmlns="">
+        <mc:Fallback>
           <p:sp>
             <p:nvSpPr>
               <p:cNvPr id="31" name="ZoneTexte 30"/>
@@ -5921,8 +7543,8 @@
           </p:sp>
         </mc:Fallback>
       </mc:AlternateContent>
-      <mc:AlternateContent xmlns:mc="http://schemas.openxmlformats.org/markup-compatibility/2006" xmlns:a14="http://schemas.microsoft.com/office/drawing/2010/main">
-        <mc:Choice Requires="a14">
+      <mc:AlternateContent xmlns:mc="http://schemas.openxmlformats.org/markup-compatibility/2006">
+        <mc:Choice xmlns:a14="http://schemas.microsoft.com/office/drawing/2010/main" xmlns="" Requires="a14">
           <p:sp>
             <p:nvSpPr>
               <p:cNvPr id="32" name="ZoneTexte 31"/>
@@ -5998,7 +7620,7 @@
             </p:txBody>
           </p:sp>
         </mc:Choice>
-        <mc:Fallback xmlns="">
+        <mc:Fallback>
           <p:sp>
             <p:nvSpPr>
               <p:cNvPr id="32" name="ZoneTexte 31"/>
@@ -6037,8 +7659,8 @@
           </p:sp>
         </mc:Fallback>
       </mc:AlternateContent>
-      <mc:AlternateContent xmlns:mc="http://schemas.openxmlformats.org/markup-compatibility/2006" xmlns:a14="http://schemas.microsoft.com/office/drawing/2010/main">
-        <mc:Choice Requires="a14">
+      <mc:AlternateContent xmlns:mc="http://schemas.openxmlformats.org/markup-compatibility/2006">
+        <mc:Choice xmlns:a14="http://schemas.microsoft.com/office/drawing/2010/main" xmlns="" Requires="a14">
           <p:sp>
             <p:nvSpPr>
               <p:cNvPr id="33" name="ZoneTexte 32"/>
@@ -6114,7 +7736,7 @@
             </p:txBody>
           </p:sp>
         </mc:Choice>
-        <mc:Fallback xmlns="">
+        <mc:Fallback>
           <p:sp>
             <p:nvSpPr>
               <p:cNvPr id="33" name="ZoneTexte 32"/>
@@ -6297,8 +7919,8 @@
           </a:p>
         </p:txBody>
       </p:sp>
-      <mc:AlternateContent xmlns:mc="http://schemas.openxmlformats.org/markup-compatibility/2006" xmlns:a14="http://schemas.microsoft.com/office/drawing/2010/main">
-        <mc:Choice Requires="a14">
+      <mc:AlternateContent xmlns:mc="http://schemas.openxmlformats.org/markup-compatibility/2006">
+        <mc:Choice xmlns:a14="http://schemas.microsoft.com/office/drawing/2010/main" xmlns="" Requires="a14">
           <p:sp>
             <p:nvSpPr>
               <p:cNvPr id="39" name="ZoneTexte 38"/>
@@ -6374,7 +7996,7 @@
             </p:txBody>
           </p:sp>
         </mc:Choice>
-        <mc:Fallback xmlns="">
+        <mc:Fallback>
           <p:sp>
             <p:nvSpPr>
               <p:cNvPr id="39" name="ZoneTexte 38"/>
@@ -6413,8 +8035,8 @@
           </p:sp>
         </mc:Fallback>
       </mc:AlternateContent>
-      <mc:AlternateContent xmlns:mc="http://schemas.openxmlformats.org/markup-compatibility/2006" xmlns:a14="http://schemas.microsoft.com/office/drawing/2010/main">
-        <mc:Choice Requires="a14">
+      <mc:AlternateContent xmlns:mc="http://schemas.openxmlformats.org/markup-compatibility/2006">
+        <mc:Choice xmlns:a14="http://schemas.microsoft.com/office/drawing/2010/main" xmlns="" Requires="a14">
           <p:sp>
             <p:nvSpPr>
               <p:cNvPr id="40" name="ZoneTexte 39"/>
@@ -6490,7 +8112,7 @@
             </p:txBody>
           </p:sp>
         </mc:Choice>
-        <mc:Fallback xmlns="">
+        <mc:Fallback>
           <p:sp>
             <p:nvSpPr>
               <p:cNvPr id="40" name="ZoneTexte 39"/>
@@ -6529,8 +8151,8 @@
           </p:sp>
         </mc:Fallback>
       </mc:AlternateContent>
-      <mc:AlternateContent xmlns:mc="http://schemas.openxmlformats.org/markup-compatibility/2006" xmlns:a14="http://schemas.microsoft.com/office/drawing/2010/main">
-        <mc:Choice Requires="a14">
+      <mc:AlternateContent xmlns:mc="http://schemas.openxmlformats.org/markup-compatibility/2006">
+        <mc:Choice xmlns:a14="http://schemas.microsoft.com/office/drawing/2010/main" xmlns="" Requires="a14">
           <p:sp>
             <p:nvSpPr>
               <p:cNvPr id="41" name="ZoneTexte 40"/>
@@ -6606,7 +8228,7 @@
             </p:txBody>
           </p:sp>
         </mc:Choice>
-        <mc:Fallback xmlns="">
+        <mc:Fallback>
           <p:sp>
             <p:nvSpPr>
               <p:cNvPr id="41" name="ZoneTexte 40"/>
@@ -6648,7 +8270,7 @@
     </p:spTree>
     <p:extLst>
       <p:ext uri="{BB962C8B-B14F-4D97-AF65-F5344CB8AC3E}">
-        <p14:creationId xmlns:p14="http://schemas.microsoft.com/office/powerpoint/2010/main" val="4001324300"/>
+        <p14:creationId xmlns:p14="http://schemas.microsoft.com/office/powerpoint/2010/main" xmlns="" val="4001324300"/>
       </p:ext>
     </p:extLst>
   </p:cSld>
@@ -6774,8 +8396,8 @@
           </a:fontRef>
         </p:style>
       </p:cxnSp>
-      <mc:AlternateContent xmlns:mc="http://schemas.openxmlformats.org/markup-compatibility/2006" xmlns:a14="http://schemas.microsoft.com/office/drawing/2010/main">
-        <mc:Choice Requires="a14">
+      <mc:AlternateContent xmlns:mc="http://schemas.openxmlformats.org/markup-compatibility/2006">
+        <mc:Choice xmlns:a14="http://schemas.microsoft.com/office/drawing/2010/main" xmlns="" Requires="a14">
           <p:sp>
             <p:nvSpPr>
               <p:cNvPr id="13" name="ZoneTexte 12"/>
@@ -6850,7 +8472,7 @@
             </p:txBody>
           </p:sp>
         </mc:Choice>
-        <mc:Fallback xmlns="">
+        <mc:Fallback>
           <p:sp>
             <p:nvSpPr>
               <p:cNvPr id="13" name="ZoneTexte 12"/>
@@ -6889,8 +8511,8 @@
           </p:sp>
         </mc:Fallback>
       </mc:AlternateContent>
-      <mc:AlternateContent xmlns:mc="http://schemas.openxmlformats.org/markup-compatibility/2006" xmlns:a14="http://schemas.microsoft.com/office/drawing/2010/main">
-        <mc:Choice Requires="a14">
+      <mc:AlternateContent xmlns:mc="http://schemas.openxmlformats.org/markup-compatibility/2006">
+        <mc:Choice xmlns:a14="http://schemas.microsoft.com/office/drawing/2010/main" xmlns="" Requires="a14">
           <p:sp>
             <p:nvSpPr>
               <p:cNvPr id="21" name="ZoneTexte 20"/>
@@ -6965,7 +8587,7 @@
             </p:txBody>
           </p:sp>
         </mc:Choice>
-        <mc:Fallback xmlns="">
+        <mc:Fallback>
           <p:sp>
             <p:nvSpPr>
               <p:cNvPr id="21" name="ZoneTexte 20"/>
@@ -7004,8 +8626,8 @@
           </p:sp>
         </mc:Fallback>
       </mc:AlternateContent>
-      <mc:AlternateContent xmlns:mc="http://schemas.openxmlformats.org/markup-compatibility/2006" xmlns:a14="http://schemas.microsoft.com/office/drawing/2010/main">
-        <mc:Choice Requires="a14">
+      <mc:AlternateContent xmlns:mc="http://schemas.openxmlformats.org/markup-compatibility/2006">
+        <mc:Choice xmlns:a14="http://schemas.microsoft.com/office/drawing/2010/main" xmlns="" Requires="a14">
           <p:sp>
             <p:nvSpPr>
               <p:cNvPr id="22" name="ZoneTexte 21"/>
@@ -7080,7 +8702,7 @@
             </p:txBody>
           </p:sp>
         </mc:Choice>
-        <mc:Fallback xmlns="">
+        <mc:Fallback>
           <p:sp>
             <p:nvSpPr>
               <p:cNvPr id="22" name="ZoneTexte 21"/>
@@ -7119,8 +8741,8 @@
           </p:sp>
         </mc:Fallback>
       </mc:AlternateContent>
-      <mc:AlternateContent xmlns:mc="http://schemas.openxmlformats.org/markup-compatibility/2006" xmlns:a14="http://schemas.microsoft.com/office/drawing/2010/main">
-        <mc:Choice Requires="a14">
+      <mc:AlternateContent xmlns:mc="http://schemas.openxmlformats.org/markup-compatibility/2006">
+        <mc:Choice xmlns:a14="http://schemas.microsoft.com/office/drawing/2010/main" xmlns="" Requires="a14">
           <p:sp>
             <p:nvSpPr>
               <p:cNvPr id="23" name="ZoneTexte 22"/>
@@ -7183,7 +8805,7 @@
             </p:txBody>
           </p:sp>
         </mc:Choice>
-        <mc:Fallback xmlns="">
+        <mc:Fallback>
           <p:sp>
             <p:nvSpPr>
               <p:cNvPr id="23" name="ZoneTexte 22"/>
@@ -7255,8 +8877,8 @@
           </a:fontRef>
         </p:style>
       </p:cxnSp>
-      <mc:AlternateContent xmlns:mc="http://schemas.openxmlformats.org/markup-compatibility/2006" xmlns:a14="http://schemas.microsoft.com/office/drawing/2010/main">
-        <mc:Choice Requires="a14">
+      <mc:AlternateContent xmlns:mc="http://schemas.openxmlformats.org/markup-compatibility/2006">
+        <mc:Choice xmlns:a14="http://schemas.microsoft.com/office/drawing/2010/main" xmlns="" Requires="a14">
           <p:sp>
             <p:nvSpPr>
               <p:cNvPr id="30" name="ZoneTexte 29"/>
@@ -7318,7 +8940,7 @@
             </p:txBody>
           </p:sp>
         </mc:Choice>
-        <mc:Fallback xmlns="">
+        <mc:Fallback>
           <p:sp>
             <p:nvSpPr>
               <p:cNvPr id="30" name="ZoneTexte 29"/>
@@ -7562,8 +9184,8 @@
           </a:fontRef>
         </p:style>
       </p:cxnSp>
-      <mc:AlternateContent xmlns:mc="http://schemas.openxmlformats.org/markup-compatibility/2006" xmlns:a14="http://schemas.microsoft.com/office/drawing/2010/main">
-        <mc:Choice Requires="a14">
+      <mc:AlternateContent xmlns:mc="http://schemas.openxmlformats.org/markup-compatibility/2006">
+        <mc:Choice xmlns:a14="http://schemas.microsoft.com/office/drawing/2010/main" xmlns="" Requires="a14">
           <p:sp>
             <p:nvSpPr>
               <p:cNvPr id="56" name="ZoneTexte 55"/>
@@ -7625,7 +9247,7 @@
             </p:txBody>
           </p:sp>
         </mc:Choice>
-        <mc:Fallback xmlns="">
+        <mc:Fallback>
           <p:sp>
             <p:nvSpPr>
               <p:cNvPr id="56" name="ZoneTexte 55"/>
@@ -7664,8 +9286,8 @@
           </p:sp>
         </mc:Fallback>
       </mc:AlternateContent>
-      <mc:AlternateContent xmlns:mc="http://schemas.openxmlformats.org/markup-compatibility/2006" xmlns:a14="http://schemas.microsoft.com/office/drawing/2010/main">
-        <mc:Choice Requires="a14">
+      <mc:AlternateContent xmlns:mc="http://schemas.openxmlformats.org/markup-compatibility/2006">
+        <mc:Choice xmlns:a14="http://schemas.microsoft.com/office/drawing/2010/main" xmlns="" Requires="a14">
           <p:sp>
             <p:nvSpPr>
               <p:cNvPr id="57" name="ZoneTexte 56"/>
@@ -7727,7 +9349,7 @@
             </p:txBody>
           </p:sp>
         </mc:Choice>
-        <mc:Fallback xmlns="">
+        <mc:Fallback>
           <p:sp>
             <p:nvSpPr>
               <p:cNvPr id="57" name="ZoneTexte 56"/>
@@ -7766,8 +9388,8 @@
           </p:sp>
         </mc:Fallback>
       </mc:AlternateContent>
-      <mc:AlternateContent xmlns:mc="http://schemas.openxmlformats.org/markup-compatibility/2006" xmlns:a14="http://schemas.microsoft.com/office/drawing/2010/main">
-        <mc:Choice Requires="a14">
+      <mc:AlternateContent xmlns:mc="http://schemas.openxmlformats.org/markup-compatibility/2006">
+        <mc:Choice xmlns:a14="http://schemas.microsoft.com/office/drawing/2010/main" xmlns="" Requires="a14">
           <p:sp>
             <p:nvSpPr>
               <p:cNvPr id="58" name="ZoneTexte 57"/>
@@ -7829,7 +9451,7 @@
             </p:txBody>
           </p:sp>
         </mc:Choice>
-        <mc:Fallback xmlns="">
+        <mc:Fallback>
           <p:sp>
             <p:nvSpPr>
               <p:cNvPr id="58" name="ZoneTexte 57"/>
@@ -7943,7 +9565,7 @@
     </p:spTree>
     <p:extLst>
       <p:ext uri="{BB962C8B-B14F-4D97-AF65-F5344CB8AC3E}">
-        <p14:creationId xmlns:p14="http://schemas.microsoft.com/office/powerpoint/2010/main" val="336057930"/>
+        <p14:creationId xmlns:p14="http://schemas.microsoft.com/office/powerpoint/2010/main" xmlns="" val="336057930"/>
       </p:ext>
     </p:extLst>
   </p:cSld>
@@ -8069,8 +9691,8 @@
           </a:fontRef>
         </p:style>
       </p:cxnSp>
-      <mc:AlternateContent xmlns:mc="http://schemas.openxmlformats.org/markup-compatibility/2006" xmlns:a14="http://schemas.microsoft.com/office/drawing/2010/main">
-        <mc:Choice Requires="a14">
+      <mc:AlternateContent xmlns:mc="http://schemas.openxmlformats.org/markup-compatibility/2006">
+        <mc:Choice xmlns:a14="http://schemas.microsoft.com/office/drawing/2010/main" xmlns="" Requires="a14">
           <p:sp>
             <p:nvSpPr>
               <p:cNvPr id="13" name="ZoneTexte 12"/>
@@ -8145,7 +9767,7 @@
             </p:txBody>
           </p:sp>
         </mc:Choice>
-        <mc:Fallback xmlns="">
+        <mc:Fallback>
           <p:sp>
             <p:nvSpPr>
               <p:cNvPr id="13" name="ZoneTexte 12"/>
@@ -8184,8 +9806,8 @@
           </p:sp>
         </mc:Fallback>
       </mc:AlternateContent>
-      <mc:AlternateContent xmlns:mc="http://schemas.openxmlformats.org/markup-compatibility/2006" xmlns:a14="http://schemas.microsoft.com/office/drawing/2010/main">
-        <mc:Choice Requires="a14">
+      <mc:AlternateContent xmlns:mc="http://schemas.openxmlformats.org/markup-compatibility/2006">
+        <mc:Choice xmlns:a14="http://schemas.microsoft.com/office/drawing/2010/main" xmlns="" Requires="a14">
           <p:sp>
             <p:nvSpPr>
               <p:cNvPr id="21" name="ZoneTexte 20"/>
@@ -8260,7 +9882,7 @@
             </p:txBody>
           </p:sp>
         </mc:Choice>
-        <mc:Fallback xmlns="">
+        <mc:Fallback>
           <p:sp>
             <p:nvSpPr>
               <p:cNvPr id="21" name="ZoneTexte 20"/>
@@ -8299,8 +9921,8 @@
           </p:sp>
         </mc:Fallback>
       </mc:AlternateContent>
-      <mc:AlternateContent xmlns:mc="http://schemas.openxmlformats.org/markup-compatibility/2006" xmlns:a14="http://schemas.microsoft.com/office/drawing/2010/main">
-        <mc:Choice Requires="a14">
+      <mc:AlternateContent xmlns:mc="http://schemas.openxmlformats.org/markup-compatibility/2006">
+        <mc:Choice xmlns:a14="http://schemas.microsoft.com/office/drawing/2010/main" xmlns="" Requires="a14">
           <p:sp>
             <p:nvSpPr>
               <p:cNvPr id="22" name="ZoneTexte 21"/>
@@ -8375,7 +9997,7 @@
             </p:txBody>
           </p:sp>
         </mc:Choice>
-        <mc:Fallback xmlns="">
+        <mc:Fallback>
           <p:sp>
             <p:nvSpPr>
               <p:cNvPr id="22" name="ZoneTexte 21"/>
@@ -8414,8 +10036,8 @@
           </p:sp>
         </mc:Fallback>
       </mc:AlternateContent>
-      <mc:AlternateContent xmlns:mc="http://schemas.openxmlformats.org/markup-compatibility/2006" xmlns:a14="http://schemas.microsoft.com/office/drawing/2010/main">
-        <mc:Choice Requires="a14">
+      <mc:AlternateContent xmlns:mc="http://schemas.openxmlformats.org/markup-compatibility/2006">
+        <mc:Choice xmlns:a14="http://schemas.microsoft.com/office/drawing/2010/main" xmlns="" Requires="a14">
           <p:sp>
             <p:nvSpPr>
               <p:cNvPr id="23" name="ZoneTexte 22"/>
@@ -8478,7 +10100,7 @@
             </p:txBody>
           </p:sp>
         </mc:Choice>
-        <mc:Fallback xmlns="">
+        <mc:Fallback>
           <p:sp>
             <p:nvSpPr>
               <p:cNvPr id="23" name="ZoneTexte 22"/>
@@ -8550,8 +10172,8 @@
           </a:fontRef>
         </p:style>
       </p:cxnSp>
-      <mc:AlternateContent xmlns:mc="http://schemas.openxmlformats.org/markup-compatibility/2006" xmlns:a14="http://schemas.microsoft.com/office/drawing/2010/main">
-        <mc:Choice Requires="a14">
+      <mc:AlternateContent xmlns:mc="http://schemas.openxmlformats.org/markup-compatibility/2006">
+        <mc:Choice xmlns:a14="http://schemas.microsoft.com/office/drawing/2010/main" xmlns="" Requires="a14">
           <p:sp>
             <p:nvSpPr>
               <p:cNvPr id="30" name="ZoneTexte 29"/>
@@ -8613,7 +10235,7 @@
             </p:txBody>
           </p:sp>
         </mc:Choice>
-        <mc:Fallback xmlns="">
+        <mc:Fallback>
           <p:sp>
             <p:nvSpPr>
               <p:cNvPr id="30" name="ZoneTexte 29"/>
@@ -8785,8 +10407,8 @@
           </a:fontRef>
         </p:style>
       </p:cxnSp>
-      <mc:AlternateContent xmlns:mc="http://schemas.openxmlformats.org/markup-compatibility/2006" xmlns:a14="http://schemas.microsoft.com/office/drawing/2010/main">
-        <mc:Choice Requires="a14">
+      <mc:AlternateContent xmlns:mc="http://schemas.openxmlformats.org/markup-compatibility/2006">
+        <mc:Choice xmlns:a14="http://schemas.microsoft.com/office/drawing/2010/main" xmlns="" Requires="a14">
           <p:sp>
             <p:nvSpPr>
               <p:cNvPr id="57" name="ZoneTexte 56"/>
@@ -8848,7 +10470,7 @@
             </p:txBody>
           </p:sp>
         </mc:Choice>
-        <mc:Fallback xmlns="">
+        <mc:Fallback>
           <p:sp>
             <p:nvSpPr>
               <p:cNvPr id="57" name="ZoneTexte 56"/>
@@ -8887,8 +10509,8 @@
           </p:sp>
         </mc:Fallback>
       </mc:AlternateContent>
-      <mc:AlternateContent xmlns:mc="http://schemas.openxmlformats.org/markup-compatibility/2006" xmlns:a14="http://schemas.microsoft.com/office/drawing/2010/main">
-        <mc:Choice Requires="a14">
+      <mc:AlternateContent xmlns:mc="http://schemas.openxmlformats.org/markup-compatibility/2006">
+        <mc:Choice xmlns:a14="http://schemas.microsoft.com/office/drawing/2010/main" xmlns="" Requires="a14">
           <p:sp>
             <p:nvSpPr>
               <p:cNvPr id="58" name="ZoneTexte 57"/>
@@ -8950,7 +10572,7 @@
             </p:txBody>
           </p:sp>
         </mc:Choice>
-        <mc:Fallback xmlns="">
+        <mc:Fallback>
           <p:sp>
             <p:nvSpPr>
               <p:cNvPr id="58" name="ZoneTexte 57"/>
@@ -9058,8 +10680,8 @@
           </a:fontRef>
         </p:style>
       </p:cxnSp>
-      <mc:AlternateContent xmlns:mc="http://schemas.openxmlformats.org/markup-compatibility/2006" xmlns:a14="http://schemas.microsoft.com/office/drawing/2010/main">
-        <mc:Choice Requires="a14">
+      <mc:AlternateContent xmlns:mc="http://schemas.openxmlformats.org/markup-compatibility/2006">
+        <mc:Choice xmlns:a14="http://schemas.microsoft.com/office/drawing/2010/main" xmlns="" Requires="a14">
           <p:sp>
             <p:nvSpPr>
               <p:cNvPr id="37" name="ZoneTexte 36"/>
@@ -9134,7 +10756,7 @@
             </p:txBody>
           </p:sp>
         </mc:Choice>
-        <mc:Fallback xmlns="">
+        <mc:Fallback>
           <p:sp>
             <p:nvSpPr>
               <p:cNvPr id="37" name="ZoneTexte 36"/>
@@ -9206,8 +10828,8 @@
           </a:fontRef>
         </p:style>
       </p:cxnSp>
-      <mc:AlternateContent xmlns:mc="http://schemas.openxmlformats.org/markup-compatibility/2006" xmlns:a14="http://schemas.microsoft.com/office/drawing/2010/main">
-        <mc:Choice Requires="a14">
+      <mc:AlternateContent xmlns:mc="http://schemas.openxmlformats.org/markup-compatibility/2006">
+        <mc:Choice xmlns:a14="http://schemas.microsoft.com/office/drawing/2010/main" xmlns="" Requires="a14">
           <p:sp>
             <p:nvSpPr>
               <p:cNvPr id="47" name="ZoneTexte 46"/>
@@ -9282,7 +10904,7 @@
             </p:txBody>
           </p:sp>
         </mc:Choice>
-        <mc:Fallback xmlns="">
+        <mc:Fallback>
           <p:sp>
             <p:nvSpPr>
               <p:cNvPr id="47" name="ZoneTexte 46"/>
@@ -9366,8 +10988,8 @@
           </a:p>
         </p:txBody>
       </p:sp>
-      <mc:AlternateContent xmlns:mc="http://schemas.openxmlformats.org/markup-compatibility/2006" xmlns:a14="http://schemas.microsoft.com/office/drawing/2010/main">
-        <mc:Choice Requires="a14">
+      <mc:AlternateContent xmlns:mc="http://schemas.openxmlformats.org/markup-compatibility/2006">
+        <mc:Choice xmlns:a14="http://schemas.microsoft.com/office/drawing/2010/main" xmlns="" Requires="a14">
           <p:sp>
             <p:nvSpPr>
               <p:cNvPr id="49" name="ZoneTexte 48"/>
@@ -9429,7 +11051,7 @@
             </p:txBody>
           </p:sp>
         </mc:Choice>
-        <mc:Fallback xmlns="">
+        <mc:Fallback>
           <p:sp>
             <p:nvSpPr>
               <p:cNvPr id="49" name="ZoneTexte 48"/>
@@ -9471,7 +11093,7 @@
     </p:spTree>
     <p:extLst>
       <p:ext uri="{BB962C8B-B14F-4D97-AF65-F5344CB8AC3E}">
-        <p14:creationId xmlns:p14="http://schemas.microsoft.com/office/powerpoint/2010/main" val="913052297"/>
+        <p14:creationId xmlns:p14="http://schemas.microsoft.com/office/powerpoint/2010/main" xmlns="" val="913052297"/>
       </p:ext>
     </p:extLst>
   </p:cSld>
@@ -9564,8 +11186,8 @@
           </a:fontRef>
         </p:style>
       </p:cxnSp>
-      <mc:AlternateContent xmlns:mc="http://schemas.openxmlformats.org/markup-compatibility/2006" xmlns:a14="http://schemas.microsoft.com/office/drawing/2010/main">
-        <mc:Choice Requires="a14">
+      <mc:AlternateContent xmlns:mc="http://schemas.openxmlformats.org/markup-compatibility/2006">
+        <mc:Choice xmlns:a14="http://schemas.microsoft.com/office/drawing/2010/main" xmlns="" Requires="a14">
           <p:sp>
             <p:nvSpPr>
               <p:cNvPr id="13" name="ZoneTexte 12"/>
@@ -9640,7 +11262,7 @@
             </p:txBody>
           </p:sp>
         </mc:Choice>
-        <mc:Fallback xmlns="">
+        <mc:Fallback>
           <p:sp>
             <p:nvSpPr>
               <p:cNvPr id="13" name="ZoneTexte 12"/>
@@ -9712,8 +11334,8 @@
           </a:fontRef>
         </p:style>
       </p:cxnSp>
-      <mc:AlternateContent xmlns:mc="http://schemas.openxmlformats.org/markup-compatibility/2006" xmlns:a14="http://schemas.microsoft.com/office/drawing/2010/main">
-        <mc:Choice Requires="a14">
+      <mc:AlternateContent xmlns:mc="http://schemas.openxmlformats.org/markup-compatibility/2006">
+        <mc:Choice xmlns:a14="http://schemas.microsoft.com/office/drawing/2010/main" xmlns="" Requires="a14">
           <p:sp>
             <p:nvSpPr>
               <p:cNvPr id="37" name="ZoneTexte 36"/>
@@ -9788,7 +11410,7 @@
             </p:txBody>
           </p:sp>
         </mc:Choice>
-        <mc:Fallback xmlns="">
+        <mc:Fallback>
           <p:sp>
             <p:nvSpPr>
               <p:cNvPr id="37" name="ZoneTexte 36"/>
@@ -9827,8 +11449,8 @@
           </p:sp>
         </mc:Fallback>
       </mc:AlternateContent>
-      <mc:AlternateContent xmlns:mc="http://schemas.openxmlformats.org/markup-compatibility/2006" xmlns:a14="http://schemas.microsoft.com/office/drawing/2010/main">
-        <mc:Choice Requires="a14">
+      <mc:AlternateContent xmlns:mc="http://schemas.openxmlformats.org/markup-compatibility/2006">
+        <mc:Choice xmlns:a14="http://schemas.microsoft.com/office/drawing/2010/main" xmlns="" Requires="a14">
           <p:sp>
             <p:nvSpPr>
               <p:cNvPr id="47" name="ZoneTexte 46"/>
@@ -9903,7 +11525,7 @@
             </p:txBody>
           </p:sp>
         </mc:Choice>
-        <mc:Fallback xmlns="">
+        <mc:Fallback>
           <p:sp>
             <p:nvSpPr>
               <p:cNvPr id="47" name="ZoneTexte 46"/>
@@ -9942,8 +11564,8 @@
           </p:sp>
         </mc:Fallback>
       </mc:AlternateContent>
-      <mc:AlternateContent xmlns:mc="http://schemas.openxmlformats.org/markup-compatibility/2006" xmlns:a14="http://schemas.microsoft.com/office/drawing/2010/main">
-        <mc:Choice Requires="a14">
+      <mc:AlternateContent xmlns:mc="http://schemas.openxmlformats.org/markup-compatibility/2006">
+        <mc:Choice xmlns:a14="http://schemas.microsoft.com/office/drawing/2010/main" xmlns="" Requires="a14">
           <p:sp>
             <p:nvSpPr>
               <p:cNvPr id="49" name="ZoneTexte 48"/>
@@ -10005,7 +11627,7 @@
             </p:txBody>
           </p:sp>
         </mc:Choice>
-        <mc:Fallback xmlns="">
+        <mc:Fallback>
           <p:sp>
             <p:nvSpPr>
               <p:cNvPr id="49" name="ZoneTexte 48"/>
@@ -10077,8 +11699,8 @@
           </a:fontRef>
         </p:style>
       </p:cxnSp>
-      <mc:AlternateContent xmlns:mc="http://schemas.openxmlformats.org/markup-compatibility/2006" xmlns:a14="http://schemas.microsoft.com/office/drawing/2010/main">
-        <mc:Choice Requires="a14">
+      <mc:AlternateContent xmlns:mc="http://schemas.openxmlformats.org/markup-compatibility/2006">
+        <mc:Choice xmlns:a14="http://schemas.microsoft.com/office/drawing/2010/main" xmlns="" Requires="a14">
           <p:sp>
             <p:nvSpPr>
               <p:cNvPr id="33" name="ZoneTexte 32"/>
@@ -10153,7 +11775,7 @@
             </p:txBody>
           </p:sp>
         </mc:Choice>
-        <mc:Fallback xmlns="">
+        <mc:Fallback>
           <p:sp>
             <p:nvSpPr>
               <p:cNvPr id="33" name="ZoneTexte 32"/>
@@ -10239,7 +11861,7 @@
     </p:spTree>
     <p:extLst>
       <p:ext uri="{BB962C8B-B14F-4D97-AF65-F5344CB8AC3E}">
-        <p14:creationId xmlns:p14="http://schemas.microsoft.com/office/powerpoint/2010/main" val="899815745"/>
+        <p14:creationId xmlns:p14="http://schemas.microsoft.com/office/powerpoint/2010/main" xmlns="" val="899815745"/>
       </p:ext>
     </p:extLst>
   </p:cSld>
@@ -10365,8 +11987,8 @@
           </a:fontRef>
         </p:style>
       </p:cxnSp>
-      <mc:AlternateContent xmlns:mc="http://schemas.openxmlformats.org/markup-compatibility/2006" xmlns:a14="http://schemas.microsoft.com/office/drawing/2010/main">
-        <mc:Choice Requires="a14">
+      <mc:AlternateContent xmlns:mc="http://schemas.openxmlformats.org/markup-compatibility/2006">
+        <mc:Choice xmlns:a14="http://schemas.microsoft.com/office/drawing/2010/main" xmlns="" Requires="a14">
           <p:sp>
             <p:nvSpPr>
               <p:cNvPr id="13" name="ZoneTexte 12"/>
@@ -10441,7 +12063,7 @@
             </p:txBody>
           </p:sp>
         </mc:Choice>
-        <mc:Fallback xmlns="">
+        <mc:Fallback>
           <p:sp>
             <p:nvSpPr>
               <p:cNvPr id="13" name="ZoneTexte 12"/>
@@ -10480,8 +12102,8 @@
           </p:sp>
         </mc:Fallback>
       </mc:AlternateContent>
-      <mc:AlternateContent xmlns:mc="http://schemas.openxmlformats.org/markup-compatibility/2006" xmlns:a14="http://schemas.microsoft.com/office/drawing/2010/main">
-        <mc:Choice Requires="a14">
+      <mc:AlternateContent xmlns:mc="http://schemas.openxmlformats.org/markup-compatibility/2006">
+        <mc:Choice xmlns:a14="http://schemas.microsoft.com/office/drawing/2010/main" xmlns="" Requires="a14">
           <p:sp>
             <p:nvSpPr>
               <p:cNvPr id="21" name="ZoneTexte 20"/>
@@ -10556,7 +12178,7 @@
             </p:txBody>
           </p:sp>
         </mc:Choice>
-        <mc:Fallback xmlns="">
+        <mc:Fallback>
           <p:sp>
             <p:nvSpPr>
               <p:cNvPr id="21" name="ZoneTexte 20"/>
@@ -10595,8 +12217,8 @@
           </p:sp>
         </mc:Fallback>
       </mc:AlternateContent>
-      <mc:AlternateContent xmlns:mc="http://schemas.openxmlformats.org/markup-compatibility/2006" xmlns:a14="http://schemas.microsoft.com/office/drawing/2010/main">
-        <mc:Choice Requires="a14">
+      <mc:AlternateContent xmlns:mc="http://schemas.openxmlformats.org/markup-compatibility/2006">
+        <mc:Choice xmlns:a14="http://schemas.microsoft.com/office/drawing/2010/main" xmlns="" Requires="a14">
           <p:sp>
             <p:nvSpPr>
               <p:cNvPr id="22" name="ZoneTexte 21"/>
@@ -10671,7 +12293,7 @@
             </p:txBody>
           </p:sp>
         </mc:Choice>
-        <mc:Fallback xmlns="">
+        <mc:Fallback>
           <p:sp>
             <p:nvSpPr>
               <p:cNvPr id="22" name="ZoneTexte 21"/>
@@ -10710,8 +12332,8 @@
           </p:sp>
         </mc:Fallback>
       </mc:AlternateContent>
-      <mc:AlternateContent xmlns:mc="http://schemas.openxmlformats.org/markup-compatibility/2006" xmlns:a14="http://schemas.microsoft.com/office/drawing/2010/main">
-        <mc:Choice Requires="a14">
+      <mc:AlternateContent xmlns:mc="http://schemas.openxmlformats.org/markup-compatibility/2006">
+        <mc:Choice xmlns:a14="http://schemas.microsoft.com/office/drawing/2010/main" xmlns="" Requires="a14">
           <p:sp>
             <p:nvSpPr>
               <p:cNvPr id="23" name="ZoneTexte 22"/>
@@ -10774,7 +12396,7 @@
             </p:txBody>
           </p:sp>
         </mc:Choice>
-        <mc:Fallback xmlns="">
+        <mc:Fallback>
           <p:sp>
             <p:nvSpPr>
               <p:cNvPr id="23" name="ZoneTexte 22"/>
@@ -10846,8 +12468,8 @@
           </a:fontRef>
         </p:style>
       </p:cxnSp>
-      <mc:AlternateContent xmlns:mc="http://schemas.openxmlformats.org/markup-compatibility/2006" xmlns:a14="http://schemas.microsoft.com/office/drawing/2010/main">
-        <mc:Choice Requires="a14">
+      <mc:AlternateContent xmlns:mc="http://schemas.openxmlformats.org/markup-compatibility/2006">
+        <mc:Choice xmlns:a14="http://schemas.microsoft.com/office/drawing/2010/main" xmlns="" Requires="a14">
           <p:sp>
             <p:nvSpPr>
               <p:cNvPr id="30" name="ZoneTexte 29"/>
@@ -10909,7 +12531,7 @@
             </p:txBody>
           </p:sp>
         </mc:Choice>
-        <mc:Fallback xmlns="">
+        <mc:Fallback>
           <p:sp>
             <p:nvSpPr>
               <p:cNvPr id="30" name="ZoneTexte 29"/>
@@ -11081,8 +12703,8 @@
           </a:fontRef>
         </p:style>
       </p:cxnSp>
-      <mc:AlternateContent xmlns:mc="http://schemas.openxmlformats.org/markup-compatibility/2006" xmlns:a14="http://schemas.microsoft.com/office/drawing/2010/main">
-        <mc:Choice Requires="a14">
+      <mc:AlternateContent xmlns:mc="http://schemas.openxmlformats.org/markup-compatibility/2006">
+        <mc:Choice xmlns:a14="http://schemas.microsoft.com/office/drawing/2010/main" xmlns="" Requires="a14">
           <p:sp>
             <p:nvSpPr>
               <p:cNvPr id="57" name="ZoneTexte 56"/>
@@ -11144,7 +12766,7 @@
             </p:txBody>
           </p:sp>
         </mc:Choice>
-        <mc:Fallback xmlns="">
+        <mc:Fallback>
           <p:sp>
             <p:nvSpPr>
               <p:cNvPr id="57" name="ZoneTexte 56"/>
@@ -11183,8 +12805,8 @@
           </p:sp>
         </mc:Fallback>
       </mc:AlternateContent>
-      <mc:AlternateContent xmlns:mc="http://schemas.openxmlformats.org/markup-compatibility/2006" xmlns:a14="http://schemas.microsoft.com/office/drawing/2010/main">
-        <mc:Choice Requires="a14">
+      <mc:AlternateContent xmlns:mc="http://schemas.openxmlformats.org/markup-compatibility/2006">
+        <mc:Choice xmlns:a14="http://schemas.microsoft.com/office/drawing/2010/main" xmlns="" Requires="a14">
           <p:sp>
             <p:nvSpPr>
               <p:cNvPr id="58" name="ZoneTexte 57"/>
@@ -11246,7 +12868,7 @@
             </p:txBody>
           </p:sp>
         </mc:Choice>
-        <mc:Fallback xmlns="">
+        <mc:Fallback>
           <p:sp>
             <p:nvSpPr>
               <p:cNvPr id="58" name="ZoneTexte 57"/>
@@ -11354,8 +12976,8 @@
           </a:fontRef>
         </p:style>
       </p:cxnSp>
-      <mc:AlternateContent xmlns:mc="http://schemas.openxmlformats.org/markup-compatibility/2006" xmlns:a14="http://schemas.microsoft.com/office/drawing/2010/main">
-        <mc:Choice Requires="a14">
+      <mc:AlternateContent xmlns:mc="http://schemas.openxmlformats.org/markup-compatibility/2006">
+        <mc:Choice xmlns:a14="http://schemas.microsoft.com/office/drawing/2010/main" xmlns="" Requires="a14">
           <p:sp>
             <p:nvSpPr>
               <p:cNvPr id="37" name="ZoneTexte 36"/>
@@ -11430,7 +13052,7 @@
             </p:txBody>
           </p:sp>
         </mc:Choice>
-        <mc:Fallback xmlns="">
+        <mc:Fallback>
           <p:sp>
             <p:nvSpPr>
               <p:cNvPr id="37" name="ZoneTexte 36"/>
@@ -11514,8 +13136,8 @@
           </a:p>
         </p:txBody>
       </p:sp>
-      <mc:AlternateContent xmlns:mc="http://schemas.openxmlformats.org/markup-compatibility/2006" xmlns:a14="http://schemas.microsoft.com/office/drawing/2010/main">
-        <mc:Choice Requires="a14">
+      <mc:AlternateContent xmlns:mc="http://schemas.openxmlformats.org/markup-compatibility/2006">
+        <mc:Choice xmlns:a14="http://schemas.microsoft.com/office/drawing/2010/main" xmlns="" Requires="a14">
           <p:sp>
             <p:nvSpPr>
               <p:cNvPr id="49" name="ZoneTexte 48"/>
@@ -11577,7 +13199,7 @@
             </p:txBody>
           </p:sp>
         </mc:Choice>
-        <mc:Fallback xmlns="">
+        <mc:Fallback>
           <p:sp>
             <p:nvSpPr>
               <p:cNvPr id="49" name="ZoneTexte 48"/>
@@ -11595,7 +13217,7 @@
                 <a:avLst/>
               </a:prstGeom>
               <a:blipFill rotWithShape="1">
-                <a:blip r:embed="rId11"/>
+                <a:blip r:embed="rId10"/>
                 <a:stretch>
                   <a:fillRect b="-5882"/>
                 </a:stretch>
@@ -11694,8 +13316,8 @@
           </a:p>
         </p:txBody>
       </p:sp>
-      <mc:AlternateContent xmlns:mc="http://schemas.openxmlformats.org/markup-compatibility/2006" xmlns:a14="http://schemas.microsoft.com/office/drawing/2010/main">
-        <mc:Choice Requires="a14">
+      <mc:AlternateContent xmlns:mc="http://schemas.openxmlformats.org/markup-compatibility/2006">
+        <mc:Choice xmlns:a14="http://schemas.microsoft.com/office/drawing/2010/main" xmlns="" Requires="a14">
           <p:sp>
             <p:nvSpPr>
               <p:cNvPr id="27" name="ZoneTexte 26"/>
@@ -11756,7 +13378,7 @@
             </p:txBody>
           </p:sp>
         </mc:Choice>
-        <mc:Fallback xmlns="">
+        <mc:Fallback>
           <p:sp>
             <p:nvSpPr>
               <p:cNvPr id="27" name="ZoneTexte 26"/>
@@ -11774,7 +13396,7 @@
                 <a:avLst/>
               </a:prstGeom>
               <a:blipFill rotWithShape="1">
-                <a:blip r:embed="rId12"/>
+                <a:blip r:embed="rId11"/>
                 <a:stretch>
                   <a:fillRect b="-2000"/>
                 </a:stretch>
@@ -11795,8 +13417,8 @@
           </p:sp>
         </mc:Fallback>
       </mc:AlternateContent>
-      <mc:AlternateContent xmlns:mc="http://schemas.openxmlformats.org/markup-compatibility/2006" xmlns:a14="http://schemas.microsoft.com/office/drawing/2010/main">
-        <mc:Choice Requires="a14">
+      <mc:AlternateContent xmlns:mc="http://schemas.openxmlformats.org/markup-compatibility/2006">
+        <mc:Choice xmlns:a14="http://schemas.microsoft.com/office/drawing/2010/main" xmlns="" Requires="a14">
           <p:sp>
             <p:nvSpPr>
               <p:cNvPr id="29" name="ZoneTexte 28"/>
@@ -11852,7 +13474,7 @@
             </p:txBody>
           </p:sp>
         </mc:Choice>
-        <mc:Fallback xmlns="">
+        <mc:Fallback>
           <p:sp>
             <p:nvSpPr>
               <p:cNvPr id="29" name="ZoneTexte 28"/>
@@ -11870,7 +13492,7 @@
                 <a:avLst/>
               </a:prstGeom>
               <a:blipFill rotWithShape="1">
-                <a:blip r:embed="rId13"/>
+                <a:blip r:embed="rId12"/>
                 <a:stretch>
                   <a:fillRect/>
                 </a:stretch>
@@ -11894,7 +13516,7 @@
     </p:spTree>
     <p:extLst>
       <p:ext uri="{BB962C8B-B14F-4D97-AF65-F5344CB8AC3E}">
-        <p14:creationId xmlns:p14="http://schemas.microsoft.com/office/powerpoint/2010/main" val="132197970"/>
+        <p14:creationId xmlns:p14="http://schemas.microsoft.com/office/powerpoint/2010/main" xmlns="" val="132197970"/>
       </p:ext>
     </p:extLst>
   </p:cSld>
@@ -11988,7 +13610,7 @@
         </p:style>
       </p:cxnSp>
       <mc:AlternateContent xmlns:mc="http://schemas.openxmlformats.org/markup-compatibility/2006">
-        <mc:Choice xmlns:a14="http://schemas.microsoft.com/office/drawing/2010/main" Requires="a14">
+        <mc:Choice xmlns:a14="http://schemas.microsoft.com/office/drawing/2010/main" xmlns="" Requires="a14">
           <p:sp>
             <p:nvSpPr>
               <p:cNvPr id="21" name="ZoneTexte 20"/>
@@ -12084,7 +13706,7 @@
         </mc:Fallback>
       </mc:AlternateContent>
       <mc:AlternateContent xmlns:mc="http://schemas.openxmlformats.org/markup-compatibility/2006">
-        <mc:Choice xmlns:a14="http://schemas.microsoft.com/office/drawing/2010/main" Requires="a14">
+        <mc:Choice xmlns:a14="http://schemas.microsoft.com/office/drawing/2010/main" xmlns="" Requires="a14">
           <p:sp>
             <p:nvSpPr>
               <p:cNvPr id="22" name="ZoneTexte 21"/>
@@ -12180,7 +13802,7 @@
         </mc:Fallback>
       </mc:AlternateContent>
       <mc:AlternateContent xmlns:mc="http://schemas.openxmlformats.org/markup-compatibility/2006">
-        <mc:Choice xmlns:a14="http://schemas.microsoft.com/office/drawing/2010/main" Requires="a14">
+        <mc:Choice xmlns:a14="http://schemas.microsoft.com/office/drawing/2010/main" xmlns="" Requires="a14">
           <p:sp>
             <p:nvSpPr>
               <p:cNvPr id="23" name="ZoneTexte 22"/>
@@ -12264,7 +13886,7 @@
         </mc:Fallback>
       </mc:AlternateContent>
       <mc:AlternateContent xmlns:mc="http://schemas.openxmlformats.org/markup-compatibility/2006">
-        <mc:Choice xmlns:a14="http://schemas.microsoft.com/office/drawing/2010/main" Requires="a14">
+        <mc:Choice xmlns:a14="http://schemas.microsoft.com/office/drawing/2010/main" xmlns="" Requires="a14">
           <p:sp>
             <p:nvSpPr>
               <p:cNvPr id="30" name="ZoneTexte 29"/>
@@ -12499,7 +14121,7 @@
         </p:style>
       </p:cxnSp>
       <mc:AlternateContent xmlns:mc="http://schemas.openxmlformats.org/markup-compatibility/2006">
-        <mc:Choice xmlns:a14="http://schemas.microsoft.com/office/drawing/2010/main" Requires="a14">
+        <mc:Choice xmlns:a14="http://schemas.microsoft.com/office/drawing/2010/main" xmlns="" Requires="a14">
           <p:sp>
             <p:nvSpPr>
               <p:cNvPr id="57" name="ZoneTexte 56"/>
@@ -12601,7 +14223,7 @@
         </mc:Fallback>
       </mc:AlternateContent>
       <mc:AlternateContent xmlns:mc="http://schemas.openxmlformats.org/markup-compatibility/2006">
-        <mc:Choice xmlns:a14="http://schemas.microsoft.com/office/drawing/2010/main" Requires="a14">
+        <mc:Choice xmlns:a14="http://schemas.microsoft.com/office/drawing/2010/main" xmlns="" Requires="a14">
           <p:sp>
             <p:nvSpPr>
               <p:cNvPr id="37" name="ZoneTexte 36"/>
@@ -12716,7 +14338,7 @@
         </mc:Fallback>
       </mc:AlternateContent>
       <mc:AlternateContent xmlns:mc="http://schemas.openxmlformats.org/markup-compatibility/2006">
-        <mc:Choice xmlns:a14="http://schemas.microsoft.com/office/drawing/2010/main" Requires="a14">
+        <mc:Choice xmlns:a14="http://schemas.microsoft.com/office/drawing/2010/main" xmlns="" Requires="a14">
           <p:sp>
             <p:nvSpPr>
               <p:cNvPr id="49" name="ZoneTexte 48"/>
@@ -13031,7 +14653,7 @@
         </p:style>
       </p:cxnSp>
       <mc:AlternateContent xmlns:mc="http://schemas.openxmlformats.org/markup-compatibility/2006">
-        <mc:Choice xmlns:a14="http://schemas.microsoft.com/office/drawing/2010/main" Requires="a14">
+        <mc:Choice xmlns:a14="http://schemas.microsoft.com/office/drawing/2010/main" xmlns="" Requires="a14">
           <p:sp>
             <p:nvSpPr>
               <p:cNvPr id="43" name="ZoneTexte 42"/>
@@ -13184,7 +14806,7 @@
     </p:spTree>
     <p:extLst>
       <p:ext uri="{BB962C8B-B14F-4D97-AF65-F5344CB8AC3E}">
-        <p14:creationId xmlns:p14="http://schemas.microsoft.com/office/powerpoint/2010/main" val="441877392"/>
+        <p14:creationId xmlns:p14="http://schemas.microsoft.com/office/powerpoint/2010/main" xmlns="" val="441877392"/>
       </p:ext>
     </p:extLst>
   </p:cSld>
@@ -13313,8 +14935,8 @@
           </a:fontRef>
         </p:style>
       </p:cxnSp>
-      <mc:AlternateContent xmlns:mc="http://schemas.openxmlformats.org/markup-compatibility/2006" xmlns:a14="http://schemas.microsoft.com/office/drawing/2010/main">
-        <mc:Choice Requires="a14">
+      <mc:AlternateContent xmlns:mc="http://schemas.openxmlformats.org/markup-compatibility/2006">
+        <mc:Choice xmlns:a14="http://schemas.microsoft.com/office/drawing/2010/main" xmlns="" Requires="a14">
           <p:sp>
             <p:nvSpPr>
               <p:cNvPr id="6" name="ZoneTexte 5"/>
@@ -13389,7 +15011,7 @@
             </p:txBody>
           </p:sp>
         </mc:Choice>
-        <mc:Fallback xmlns="">
+        <mc:Fallback>
           <p:sp>
             <p:nvSpPr>
               <p:cNvPr id="6" name="ZoneTexte 5"/>
@@ -13428,8 +15050,8 @@
           </p:sp>
         </mc:Fallback>
       </mc:AlternateContent>
-      <mc:AlternateContent xmlns:mc="http://schemas.openxmlformats.org/markup-compatibility/2006" xmlns:a14="http://schemas.microsoft.com/office/drawing/2010/main">
-        <mc:Choice Requires="a14">
+      <mc:AlternateContent xmlns:mc="http://schemas.openxmlformats.org/markup-compatibility/2006">
+        <mc:Choice xmlns:a14="http://schemas.microsoft.com/office/drawing/2010/main" xmlns="" Requires="a14">
           <p:sp>
             <p:nvSpPr>
               <p:cNvPr id="12" name="ZoneTexte 11"/>
@@ -13504,7 +15126,7 @@
             </p:txBody>
           </p:sp>
         </mc:Choice>
-        <mc:Fallback xmlns="">
+        <mc:Fallback>
           <p:sp>
             <p:nvSpPr>
               <p:cNvPr id="12" name="ZoneTexte 11"/>
@@ -13615,8 +15237,8 @@
           </a:fontRef>
         </p:style>
       </p:cxnSp>
-      <mc:AlternateContent xmlns:mc="http://schemas.openxmlformats.org/markup-compatibility/2006" xmlns:a14="http://schemas.microsoft.com/office/drawing/2010/main">
-        <mc:Choice Requires="a14">
+      <mc:AlternateContent xmlns:mc="http://schemas.openxmlformats.org/markup-compatibility/2006">
+        <mc:Choice xmlns:a14="http://schemas.microsoft.com/office/drawing/2010/main" xmlns="" Requires="a14">
           <p:sp>
             <p:nvSpPr>
               <p:cNvPr id="16" name="ZoneTexte 15"/>
@@ -13691,7 +15313,7 @@
             </p:txBody>
           </p:sp>
         </mc:Choice>
-        <mc:Fallback xmlns="">
+        <mc:Fallback>
           <p:sp>
             <p:nvSpPr>
               <p:cNvPr id="16" name="ZoneTexte 15"/>
@@ -13730,8 +15352,8 @@
           </p:sp>
         </mc:Fallback>
       </mc:AlternateContent>
-      <mc:AlternateContent xmlns:mc="http://schemas.openxmlformats.org/markup-compatibility/2006" xmlns:a14="http://schemas.microsoft.com/office/drawing/2010/main">
-        <mc:Choice Requires="a14">
+      <mc:AlternateContent xmlns:mc="http://schemas.openxmlformats.org/markup-compatibility/2006">
+        <mc:Choice xmlns:a14="http://schemas.microsoft.com/office/drawing/2010/main" xmlns="" Requires="a14">
           <p:sp>
             <p:nvSpPr>
               <p:cNvPr id="17" name="ZoneTexte 16"/>
@@ -13806,7 +15428,7 @@
             </p:txBody>
           </p:sp>
         </mc:Choice>
-        <mc:Fallback xmlns="">
+        <mc:Fallback>
           <p:sp>
             <p:nvSpPr>
               <p:cNvPr id="17" name="ZoneTexte 16"/>
@@ -13845,8 +15467,8 @@
           </p:sp>
         </mc:Fallback>
       </mc:AlternateContent>
-      <mc:AlternateContent xmlns:mc="http://schemas.openxmlformats.org/markup-compatibility/2006" xmlns:a14="http://schemas.microsoft.com/office/drawing/2010/main">
-        <mc:Choice Requires="a14">
+      <mc:AlternateContent xmlns:mc="http://schemas.openxmlformats.org/markup-compatibility/2006">
+        <mc:Choice xmlns:a14="http://schemas.microsoft.com/office/drawing/2010/main" xmlns="" Requires="a14">
           <p:sp>
             <p:nvSpPr>
               <p:cNvPr id="18" name="ZoneTexte 17"/>
@@ -13909,7 +15531,7 @@
             </p:txBody>
           </p:sp>
         </mc:Choice>
-        <mc:Fallback xmlns="">
+        <mc:Fallback>
           <p:sp>
             <p:nvSpPr>
               <p:cNvPr id="18" name="ZoneTexte 17"/>
@@ -13948,8 +15570,8 @@
           </p:sp>
         </mc:Fallback>
       </mc:AlternateContent>
-      <mc:AlternateContent xmlns:mc="http://schemas.openxmlformats.org/markup-compatibility/2006" xmlns:a14="http://schemas.microsoft.com/office/drawing/2010/main">
-        <mc:Choice Requires="a14">
+      <mc:AlternateContent xmlns:mc="http://schemas.openxmlformats.org/markup-compatibility/2006">
+        <mc:Choice xmlns:a14="http://schemas.microsoft.com/office/drawing/2010/main" xmlns="" Requires="a14">
           <p:sp>
             <p:nvSpPr>
               <p:cNvPr id="19" name="ZoneTexte 18"/>
@@ -14012,7 +15634,7 @@
             </p:txBody>
           </p:sp>
         </mc:Choice>
-        <mc:Fallback xmlns="">
+        <mc:Fallback>
           <p:sp>
             <p:nvSpPr>
               <p:cNvPr id="19" name="ZoneTexte 18"/>
@@ -14087,8 +15709,8 @@
           </a:fontRef>
         </p:style>
       </p:cxnSp>
-      <mc:AlternateContent xmlns:mc="http://schemas.openxmlformats.org/markup-compatibility/2006" xmlns:a14="http://schemas.microsoft.com/office/drawing/2010/main">
-        <mc:Choice Requires="a14">
+      <mc:AlternateContent xmlns:mc="http://schemas.openxmlformats.org/markup-compatibility/2006">
+        <mc:Choice xmlns:a14="http://schemas.microsoft.com/office/drawing/2010/main" xmlns="" Requires="a14">
           <p:sp>
             <p:nvSpPr>
               <p:cNvPr id="23" name="ZoneTexte 22"/>
@@ -14150,7 +15772,7 @@
             </p:txBody>
           </p:sp>
         </mc:Choice>
-        <mc:Fallback xmlns="">
+        <mc:Fallback>
           <p:sp>
             <p:nvSpPr>
               <p:cNvPr id="23" name="ZoneTexte 22"/>
@@ -14291,8 +15913,8 @@
           </a:fontRef>
         </p:style>
       </p:cxnSp>
-      <mc:AlternateContent xmlns:mc="http://schemas.openxmlformats.org/markup-compatibility/2006" xmlns:a14="http://schemas.microsoft.com/office/drawing/2010/main">
-        <mc:Choice Requires="a14">
+      <mc:AlternateContent xmlns:mc="http://schemas.openxmlformats.org/markup-compatibility/2006">
+        <mc:Choice xmlns:a14="http://schemas.microsoft.com/office/drawing/2010/main" xmlns="" Requires="a14">
           <p:sp>
             <p:nvSpPr>
               <p:cNvPr id="30" name="ZoneTexte 29"/>
@@ -14367,7 +15989,7 @@
             </p:txBody>
           </p:sp>
         </mc:Choice>
-        <mc:Fallback xmlns="">
+        <mc:Fallback>
           <p:sp>
             <p:nvSpPr>
               <p:cNvPr id="30" name="ZoneTexte 29"/>
@@ -14406,8 +16028,8 @@
           </p:sp>
         </mc:Fallback>
       </mc:AlternateContent>
-      <mc:AlternateContent xmlns:mc="http://schemas.openxmlformats.org/markup-compatibility/2006" xmlns:a14="http://schemas.microsoft.com/office/drawing/2010/main">
-        <mc:Choice Requires="a14">
+      <mc:AlternateContent xmlns:mc="http://schemas.openxmlformats.org/markup-compatibility/2006">
+        <mc:Choice xmlns:a14="http://schemas.microsoft.com/office/drawing/2010/main" xmlns="" Requires="a14">
           <p:sp>
             <p:nvSpPr>
               <p:cNvPr id="31" name="ZoneTexte 30"/>
@@ -14482,7 +16104,7 @@
             </p:txBody>
           </p:sp>
         </mc:Choice>
-        <mc:Fallback xmlns="">
+        <mc:Fallback>
           <p:sp>
             <p:nvSpPr>
               <p:cNvPr id="31" name="ZoneTexte 30"/>
@@ -14608,8 +16230,8 @@
           </p:style>
         </p:cxnSp>
       </p:grpSp>
-      <mc:AlternateContent xmlns:mc="http://schemas.openxmlformats.org/markup-compatibility/2006" xmlns:a14="http://schemas.microsoft.com/office/drawing/2010/main">
-        <mc:Choice Requires="a14">
+      <mc:AlternateContent xmlns:mc="http://schemas.openxmlformats.org/markup-compatibility/2006">
+        <mc:Choice xmlns:a14="http://schemas.microsoft.com/office/drawing/2010/main" xmlns="" Requires="a14">
           <p:sp>
             <p:nvSpPr>
               <p:cNvPr id="34" name="ZoneTexte 33"/>
@@ -14684,7 +16306,7 @@
             </p:txBody>
           </p:sp>
         </mc:Choice>
-        <mc:Fallback xmlns="">
+        <mc:Fallback>
           <p:sp>
             <p:nvSpPr>
               <p:cNvPr id="34" name="ZoneTexte 33"/>
@@ -14723,8 +16345,8 @@
           </p:sp>
         </mc:Fallback>
       </mc:AlternateContent>
-      <mc:AlternateContent xmlns:mc="http://schemas.openxmlformats.org/markup-compatibility/2006" xmlns:a14="http://schemas.microsoft.com/office/drawing/2010/main">
-        <mc:Choice Requires="a14">
+      <mc:AlternateContent xmlns:mc="http://schemas.openxmlformats.org/markup-compatibility/2006">
+        <mc:Choice xmlns:a14="http://schemas.microsoft.com/office/drawing/2010/main" xmlns="" Requires="a14">
           <p:sp>
             <p:nvSpPr>
               <p:cNvPr id="35" name="ZoneTexte 34"/>
@@ -14799,7 +16421,7 @@
             </p:txBody>
           </p:sp>
         </mc:Choice>
-        <mc:Fallback xmlns="">
+        <mc:Fallback>
           <p:sp>
             <p:nvSpPr>
               <p:cNvPr id="35" name="ZoneTexte 34"/>
@@ -14838,8 +16460,8 @@
           </p:sp>
         </mc:Fallback>
       </mc:AlternateContent>
-      <mc:AlternateContent xmlns:mc="http://schemas.openxmlformats.org/markup-compatibility/2006" xmlns:a14="http://schemas.microsoft.com/office/drawing/2010/main">
-        <mc:Choice Requires="a14">
+      <mc:AlternateContent xmlns:mc="http://schemas.openxmlformats.org/markup-compatibility/2006">
+        <mc:Choice xmlns:a14="http://schemas.microsoft.com/office/drawing/2010/main" xmlns="" Requires="a14">
           <p:sp>
             <p:nvSpPr>
               <p:cNvPr id="36" name="ZoneTexte 35"/>
@@ -14902,7 +16524,7 @@
             </p:txBody>
           </p:sp>
         </mc:Choice>
-        <mc:Fallback xmlns="">
+        <mc:Fallback>
           <p:sp>
             <p:nvSpPr>
               <p:cNvPr id="36" name="ZoneTexte 35"/>
@@ -14989,8 +16611,8 @@
           </a:p>
         </p:txBody>
       </p:sp>
-      <mc:AlternateContent xmlns:mc="http://schemas.openxmlformats.org/markup-compatibility/2006" xmlns:a14="http://schemas.microsoft.com/office/drawing/2010/main">
-        <mc:Choice Requires="a14">
+      <mc:AlternateContent xmlns:mc="http://schemas.openxmlformats.org/markup-compatibility/2006">
+        <mc:Choice xmlns:a14="http://schemas.microsoft.com/office/drawing/2010/main" xmlns="" Requires="a14">
           <p:sp>
             <p:nvSpPr>
               <p:cNvPr id="43" name="ZoneTexte 42"/>
@@ -15052,7 +16674,7 @@
             </p:txBody>
           </p:sp>
         </mc:Choice>
-        <mc:Fallback xmlns="">
+        <mc:Fallback>
           <p:sp>
             <p:nvSpPr>
               <p:cNvPr id="43" name="ZoneTexte 42"/>
@@ -15091,8 +16713,8 @@
           </p:sp>
         </mc:Fallback>
       </mc:AlternateContent>
-      <mc:AlternateContent xmlns:mc="http://schemas.openxmlformats.org/markup-compatibility/2006" xmlns:a14="http://schemas.microsoft.com/office/drawing/2010/main">
-        <mc:Choice Requires="a14">
+      <mc:AlternateContent xmlns:mc="http://schemas.openxmlformats.org/markup-compatibility/2006">
+        <mc:Choice xmlns:a14="http://schemas.microsoft.com/office/drawing/2010/main" xmlns="" Requires="a14">
           <p:sp>
             <p:nvSpPr>
               <p:cNvPr id="44" name="ZoneTexte 43"/>
@@ -15210,7 +16832,7 @@
             </p:txBody>
           </p:sp>
         </mc:Choice>
-        <mc:Fallback xmlns="">
+        <mc:Fallback>
           <p:sp>
             <p:nvSpPr>
               <p:cNvPr id="44" name="ZoneTexte 43"/>
@@ -15252,7 +16874,7 @@
     </p:spTree>
     <p:extLst>
       <p:ext uri="{BB962C8B-B14F-4D97-AF65-F5344CB8AC3E}">
-        <p14:creationId xmlns:p14="http://schemas.microsoft.com/office/powerpoint/2010/main" val="1839276102"/>
+        <p14:creationId xmlns:p14="http://schemas.microsoft.com/office/powerpoint/2010/main" xmlns="" val="1839276102"/>
       </p:ext>
     </p:extLst>
   </p:cSld>
@@ -15345,8 +16967,8 @@
           </a:fontRef>
         </p:style>
       </p:cxnSp>
-      <mc:AlternateContent xmlns:mc="http://schemas.openxmlformats.org/markup-compatibility/2006" xmlns:a14="http://schemas.microsoft.com/office/drawing/2010/main">
-        <mc:Choice Requires="a14">
+      <mc:AlternateContent xmlns:mc="http://schemas.openxmlformats.org/markup-compatibility/2006">
+        <mc:Choice xmlns:a14="http://schemas.microsoft.com/office/drawing/2010/main" xmlns="" Requires="a14">
           <p:sp>
             <p:nvSpPr>
               <p:cNvPr id="6" name="ZoneTexte 5"/>
@@ -15421,7 +17043,7 @@
             </p:txBody>
           </p:sp>
         </mc:Choice>
-        <mc:Fallback xmlns="">
+        <mc:Fallback>
           <p:sp>
             <p:nvSpPr>
               <p:cNvPr id="6" name="ZoneTexte 5"/>
@@ -15460,8 +17082,8 @@
           </p:sp>
         </mc:Fallback>
       </mc:AlternateContent>
-      <mc:AlternateContent xmlns:mc="http://schemas.openxmlformats.org/markup-compatibility/2006" xmlns:a14="http://schemas.microsoft.com/office/drawing/2010/main">
-        <mc:Choice Requires="a14">
+      <mc:AlternateContent xmlns:mc="http://schemas.openxmlformats.org/markup-compatibility/2006">
+        <mc:Choice xmlns:a14="http://schemas.microsoft.com/office/drawing/2010/main" xmlns="" Requires="a14">
           <p:sp>
             <p:nvSpPr>
               <p:cNvPr id="7" name="ZoneTexte 6"/>
@@ -15536,7 +17158,7 @@
             </p:txBody>
           </p:sp>
         </mc:Choice>
-        <mc:Fallback xmlns="">
+        <mc:Fallback>
           <p:sp>
             <p:nvSpPr>
               <p:cNvPr id="7" name="ZoneTexte 6"/>
@@ -15662,8 +17284,8 @@
           </p:style>
         </p:cxnSp>
       </p:grpSp>
-      <mc:AlternateContent xmlns:mc="http://schemas.openxmlformats.org/markup-compatibility/2006" xmlns:a14="http://schemas.microsoft.com/office/drawing/2010/main">
-        <mc:Choice Requires="a14">
+      <mc:AlternateContent xmlns:mc="http://schemas.openxmlformats.org/markup-compatibility/2006">
+        <mc:Choice xmlns:a14="http://schemas.microsoft.com/office/drawing/2010/main" xmlns="" Requires="a14">
           <p:sp>
             <p:nvSpPr>
               <p:cNvPr id="11" name="ZoneTexte 10"/>
@@ -15719,7 +17341,7 @@
             </p:txBody>
           </p:sp>
         </mc:Choice>
-        <mc:Fallback xmlns="">
+        <mc:Fallback>
           <p:sp>
             <p:nvSpPr>
               <p:cNvPr id="11" name="ZoneTexte 10"/>
@@ -15758,8 +17380,8 @@
           </p:sp>
         </mc:Fallback>
       </mc:AlternateContent>
-      <mc:AlternateContent xmlns:mc="http://schemas.openxmlformats.org/markup-compatibility/2006" xmlns:a14="http://schemas.microsoft.com/office/drawing/2010/main">
-        <mc:Choice Requires="a14">
+      <mc:AlternateContent xmlns:mc="http://schemas.openxmlformats.org/markup-compatibility/2006">
+        <mc:Choice xmlns:a14="http://schemas.microsoft.com/office/drawing/2010/main" xmlns="" Requires="a14">
           <p:sp>
             <p:nvSpPr>
               <p:cNvPr id="12" name="ZoneTexte 11"/>
@@ -15815,7 +17437,7 @@
             </p:txBody>
           </p:sp>
         </mc:Choice>
-        <mc:Fallback xmlns="">
+        <mc:Fallback>
           <p:sp>
             <p:nvSpPr>
               <p:cNvPr id="12" name="ZoneTexte 11"/>
@@ -15854,8 +17476,8 @@
           </p:sp>
         </mc:Fallback>
       </mc:AlternateContent>
-      <mc:AlternateContent xmlns:mc="http://schemas.openxmlformats.org/markup-compatibility/2006" xmlns:a14="http://schemas.microsoft.com/office/drawing/2010/main">
-        <mc:Choice Requires="a14">
+      <mc:AlternateContent xmlns:mc="http://schemas.openxmlformats.org/markup-compatibility/2006">
+        <mc:Choice xmlns:a14="http://schemas.microsoft.com/office/drawing/2010/main" xmlns="" Requires="a14">
           <p:sp>
             <p:nvSpPr>
               <p:cNvPr id="13" name="ZoneTexte 12"/>
@@ -15918,7 +17540,7 @@
             </p:txBody>
           </p:sp>
         </mc:Choice>
-        <mc:Fallback xmlns="">
+        <mc:Fallback>
           <p:sp>
             <p:nvSpPr>
               <p:cNvPr id="13" name="ZoneTexte 12"/>
@@ -16005,8 +17627,8 @@
           </a:p>
         </p:txBody>
       </p:sp>
-      <mc:AlternateContent xmlns:mc="http://schemas.openxmlformats.org/markup-compatibility/2006" xmlns:a14="http://schemas.microsoft.com/office/drawing/2010/main">
-        <mc:Choice Requires="a14">
+      <mc:AlternateContent xmlns:mc="http://schemas.openxmlformats.org/markup-compatibility/2006">
+        <mc:Choice xmlns:a14="http://schemas.microsoft.com/office/drawing/2010/main" xmlns="" Requires="a14">
           <p:sp>
             <p:nvSpPr>
               <p:cNvPr id="15" name="ZoneTexte 14"/>
@@ -16068,7 +17690,7 @@
             </p:txBody>
           </p:sp>
         </mc:Choice>
-        <mc:Fallback xmlns="">
+        <mc:Fallback>
           <p:sp>
             <p:nvSpPr>
               <p:cNvPr id="15" name="ZoneTexte 14"/>
@@ -16107,8 +17729,8 @@
           </p:sp>
         </mc:Fallback>
       </mc:AlternateContent>
-      <mc:AlternateContent xmlns:mc="http://schemas.openxmlformats.org/markup-compatibility/2006" xmlns:a14="http://schemas.microsoft.com/office/drawing/2010/main">
-        <mc:Choice Requires="a14">
+      <mc:AlternateContent xmlns:mc="http://schemas.openxmlformats.org/markup-compatibility/2006">
+        <mc:Choice xmlns:a14="http://schemas.microsoft.com/office/drawing/2010/main" xmlns="" Requires="a14">
           <p:sp>
             <p:nvSpPr>
               <p:cNvPr id="16" name="ZoneTexte 15"/>
@@ -16183,7 +17805,7 @@
             </p:txBody>
           </p:sp>
         </mc:Choice>
-        <mc:Fallback xmlns="">
+        <mc:Fallback>
           <p:sp>
             <p:nvSpPr>
               <p:cNvPr id="16" name="ZoneTexte 15"/>
@@ -16294,8 +17916,8 @@
           </a:fontRef>
         </p:style>
       </p:cxnSp>
-      <mc:AlternateContent xmlns:mc="http://schemas.openxmlformats.org/markup-compatibility/2006" xmlns:a14="http://schemas.microsoft.com/office/drawing/2010/main">
-        <mc:Choice Requires="a14">
+      <mc:AlternateContent xmlns:mc="http://schemas.openxmlformats.org/markup-compatibility/2006">
+        <mc:Choice xmlns:a14="http://schemas.microsoft.com/office/drawing/2010/main" xmlns="" Requires="a14">
           <p:sp>
             <p:nvSpPr>
               <p:cNvPr id="28" name="ZoneTexte 27"/>
@@ -16351,7 +17973,7 @@
             </p:txBody>
           </p:sp>
         </mc:Choice>
-        <mc:Fallback xmlns="">
+        <mc:Fallback>
           <p:sp>
             <p:nvSpPr>
               <p:cNvPr id="28" name="ZoneTexte 27"/>
@@ -16477,8 +18099,8 @@
           </p:style>
         </p:cxnSp>
       </p:grpSp>
-      <mc:AlternateContent xmlns:mc="http://schemas.openxmlformats.org/markup-compatibility/2006" xmlns:a14="http://schemas.microsoft.com/office/drawing/2010/main">
-        <mc:Choice Requires="a14">
+      <mc:AlternateContent xmlns:mc="http://schemas.openxmlformats.org/markup-compatibility/2006">
+        <mc:Choice xmlns:a14="http://schemas.microsoft.com/office/drawing/2010/main" xmlns="" Requires="a14">
           <p:sp>
             <p:nvSpPr>
               <p:cNvPr id="33" name="ZoneTexte 32"/>
@@ -16534,7 +18156,7 @@
             </p:txBody>
           </p:sp>
         </mc:Choice>
-        <mc:Fallback xmlns="">
+        <mc:Fallback>
           <p:sp>
             <p:nvSpPr>
               <p:cNvPr id="33" name="ZoneTexte 32"/>
@@ -16573,8 +18195,8 @@
           </p:sp>
         </mc:Fallback>
       </mc:AlternateContent>
-      <mc:AlternateContent xmlns:mc="http://schemas.openxmlformats.org/markup-compatibility/2006" xmlns:a14="http://schemas.microsoft.com/office/drawing/2010/main">
-        <mc:Choice Requires="a14">
+      <mc:AlternateContent xmlns:mc="http://schemas.openxmlformats.org/markup-compatibility/2006">
+        <mc:Choice xmlns:a14="http://schemas.microsoft.com/office/drawing/2010/main" xmlns="" Requires="a14">
           <p:sp>
             <p:nvSpPr>
               <p:cNvPr id="34" name="ZoneTexte 33"/>
@@ -16630,7 +18252,7 @@
             </p:txBody>
           </p:sp>
         </mc:Choice>
-        <mc:Fallback xmlns="">
+        <mc:Fallback>
           <p:sp>
             <p:nvSpPr>
               <p:cNvPr id="34" name="ZoneTexte 33"/>
@@ -16669,8 +18291,8 @@
           </p:sp>
         </mc:Fallback>
       </mc:AlternateContent>
-      <mc:AlternateContent xmlns:mc="http://schemas.openxmlformats.org/markup-compatibility/2006" xmlns:a14="http://schemas.microsoft.com/office/drawing/2010/main">
-        <mc:Choice Requires="a14">
+      <mc:AlternateContent xmlns:mc="http://schemas.openxmlformats.org/markup-compatibility/2006">
+        <mc:Choice xmlns:a14="http://schemas.microsoft.com/office/drawing/2010/main" xmlns="" Requires="a14">
           <p:sp>
             <p:nvSpPr>
               <p:cNvPr id="35" name="ZoneTexte 34"/>
@@ -16733,7 +18355,7 @@
             </p:txBody>
           </p:sp>
         </mc:Choice>
-        <mc:Fallback xmlns="">
+        <mc:Fallback>
           <p:sp>
             <p:nvSpPr>
               <p:cNvPr id="35" name="ZoneTexte 34"/>
@@ -16820,8 +18442,8 @@
           </a:p>
         </p:txBody>
       </p:sp>
-      <mc:AlternateContent xmlns:mc="http://schemas.openxmlformats.org/markup-compatibility/2006" xmlns:a14="http://schemas.microsoft.com/office/drawing/2010/main">
-        <mc:Choice Requires="a14">
+      <mc:AlternateContent xmlns:mc="http://schemas.openxmlformats.org/markup-compatibility/2006">
+        <mc:Choice xmlns:a14="http://schemas.microsoft.com/office/drawing/2010/main" xmlns="" Requires="a14">
           <p:sp>
             <p:nvSpPr>
               <p:cNvPr id="37" name="ZoneTexte 36"/>
@@ -16883,7 +18505,7 @@
             </p:txBody>
           </p:sp>
         </mc:Choice>
-        <mc:Fallback xmlns="">
+        <mc:Fallback>
           <p:sp>
             <p:nvSpPr>
               <p:cNvPr id="37" name="ZoneTexte 36"/>
@@ -16922,8 +18544,8 @@
           </p:sp>
         </mc:Fallback>
       </mc:AlternateContent>
-      <mc:AlternateContent xmlns:mc="http://schemas.openxmlformats.org/markup-compatibility/2006" xmlns:a14="http://schemas.microsoft.com/office/drawing/2010/main">
-        <mc:Choice Requires="a14">
+      <mc:AlternateContent xmlns:mc="http://schemas.openxmlformats.org/markup-compatibility/2006">
+        <mc:Choice xmlns:a14="http://schemas.microsoft.com/office/drawing/2010/main" xmlns="" Requires="a14">
           <p:sp>
             <p:nvSpPr>
               <p:cNvPr id="38" name="ZoneTexte 37"/>
@@ -16998,7 +18620,7 @@
             </p:txBody>
           </p:sp>
         </mc:Choice>
-        <mc:Fallback xmlns="">
+        <mc:Fallback>
           <p:sp>
             <p:nvSpPr>
               <p:cNvPr id="38" name="ZoneTexte 37"/>
@@ -17037,8 +18659,8 @@
           </p:sp>
         </mc:Fallback>
       </mc:AlternateContent>
-      <mc:AlternateContent xmlns:mc="http://schemas.openxmlformats.org/markup-compatibility/2006" xmlns:a14="http://schemas.microsoft.com/office/drawing/2010/main">
-        <mc:Choice Requires="a14">
+      <mc:AlternateContent xmlns:mc="http://schemas.openxmlformats.org/markup-compatibility/2006">
+        <mc:Choice xmlns:a14="http://schemas.microsoft.com/office/drawing/2010/main" xmlns="" Requires="a14">
           <p:sp>
             <p:nvSpPr>
               <p:cNvPr id="39" name="ZoneTexte 38"/>
@@ -17113,7 +18735,7 @@
             </p:txBody>
           </p:sp>
         </mc:Choice>
-        <mc:Fallback xmlns="">
+        <mc:Fallback>
           <p:sp>
             <p:nvSpPr>
               <p:cNvPr id="39" name="ZoneTexte 38"/>
@@ -17224,8 +18846,8 @@
           </a:fontRef>
         </p:style>
       </p:cxnSp>
-      <mc:AlternateContent xmlns:mc="http://schemas.openxmlformats.org/markup-compatibility/2006" xmlns:a14="http://schemas.microsoft.com/office/drawing/2010/main">
-        <mc:Choice Requires="a14">
+      <mc:AlternateContent xmlns:mc="http://schemas.openxmlformats.org/markup-compatibility/2006">
+        <mc:Choice xmlns:a14="http://schemas.microsoft.com/office/drawing/2010/main" xmlns="" Requires="a14">
           <p:sp>
             <p:nvSpPr>
               <p:cNvPr id="43" name="ZoneTexte 42"/>
@@ -17300,7 +18922,7 @@
             </p:txBody>
           </p:sp>
         </mc:Choice>
-        <mc:Fallback xmlns="">
+        <mc:Fallback>
           <p:sp>
             <p:nvSpPr>
               <p:cNvPr id="43" name="ZoneTexte 42"/>
@@ -17430,8 +19052,8 @@
           </p:style>
         </p:cxnSp>
       </p:grpSp>
-      <mc:AlternateContent xmlns:mc="http://schemas.openxmlformats.org/markup-compatibility/2006" xmlns:a14="http://schemas.microsoft.com/office/drawing/2010/main">
-        <mc:Choice Requires="a14">
+      <mc:AlternateContent xmlns:mc="http://schemas.openxmlformats.org/markup-compatibility/2006">
+        <mc:Choice xmlns:a14="http://schemas.microsoft.com/office/drawing/2010/main" xmlns="" Requires="a14">
           <p:sp>
             <p:nvSpPr>
               <p:cNvPr id="47" name="ZoneTexte 46"/>
@@ -17506,7 +19128,7 @@
             </p:txBody>
           </p:sp>
         </mc:Choice>
-        <mc:Fallback xmlns="">
+        <mc:Fallback>
           <p:sp>
             <p:nvSpPr>
               <p:cNvPr id="47" name="ZoneTexte 46"/>
@@ -17545,8 +19167,8 @@
           </p:sp>
         </mc:Fallback>
       </mc:AlternateContent>
-      <mc:AlternateContent xmlns:mc="http://schemas.openxmlformats.org/markup-compatibility/2006" xmlns:a14="http://schemas.microsoft.com/office/drawing/2010/main">
-        <mc:Choice Requires="a14">
+      <mc:AlternateContent xmlns:mc="http://schemas.openxmlformats.org/markup-compatibility/2006">
+        <mc:Choice xmlns:a14="http://schemas.microsoft.com/office/drawing/2010/main" xmlns="" Requires="a14">
           <p:sp>
             <p:nvSpPr>
               <p:cNvPr id="48" name="ZoneTexte 47"/>
@@ -17602,7 +19224,7 @@
             </p:txBody>
           </p:sp>
         </mc:Choice>
-        <mc:Fallback xmlns="">
+        <mc:Fallback>
           <p:sp>
             <p:nvSpPr>
               <p:cNvPr id="48" name="ZoneTexte 47"/>
@@ -17641,8 +19263,8 @@
           </p:sp>
         </mc:Fallback>
       </mc:AlternateContent>
-      <mc:AlternateContent xmlns:mc="http://schemas.openxmlformats.org/markup-compatibility/2006" xmlns:a14="http://schemas.microsoft.com/office/drawing/2010/main">
-        <mc:Choice Requires="a14">
+      <mc:AlternateContent xmlns:mc="http://schemas.openxmlformats.org/markup-compatibility/2006">
+        <mc:Choice xmlns:a14="http://schemas.microsoft.com/office/drawing/2010/main" xmlns="" Requires="a14">
           <p:sp>
             <p:nvSpPr>
               <p:cNvPr id="49" name="ZoneTexte 48"/>
@@ -17705,7 +19327,7 @@
             </p:txBody>
           </p:sp>
         </mc:Choice>
-        <mc:Fallback xmlns="">
+        <mc:Fallback>
           <p:sp>
             <p:nvSpPr>
               <p:cNvPr id="49" name="ZoneTexte 48"/>
@@ -17792,8 +19414,8 @@
           </a:p>
         </p:txBody>
       </p:sp>
-      <mc:AlternateContent xmlns:mc="http://schemas.openxmlformats.org/markup-compatibility/2006" xmlns:a14="http://schemas.microsoft.com/office/drawing/2010/main">
-        <mc:Choice Requires="a14">
+      <mc:AlternateContent xmlns:mc="http://schemas.openxmlformats.org/markup-compatibility/2006">
+        <mc:Choice xmlns:a14="http://schemas.microsoft.com/office/drawing/2010/main" xmlns="" Requires="a14">
           <p:sp>
             <p:nvSpPr>
               <p:cNvPr id="51" name="ZoneTexte 50"/>
@@ -17855,7 +19477,7 @@
             </p:txBody>
           </p:sp>
         </mc:Choice>
-        <mc:Fallback xmlns="">
+        <mc:Fallback>
           <p:sp>
             <p:nvSpPr>
               <p:cNvPr id="51" name="ZoneTexte 50"/>
@@ -17894,8 +19516,8 @@
           </p:sp>
         </mc:Fallback>
       </mc:AlternateContent>
-      <mc:AlternateContent xmlns:mc="http://schemas.openxmlformats.org/markup-compatibility/2006" xmlns:a14="http://schemas.microsoft.com/office/drawing/2010/main">
-        <mc:Choice Requires="a14">
+      <mc:AlternateContent xmlns:mc="http://schemas.openxmlformats.org/markup-compatibility/2006">
+        <mc:Choice xmlns:a14="http://schemas.microsoft.com/office/drawing/2010/main" xmlns="" Requires="a14">
           <p:sp>
             <p:nvSpPr>
               <p:cNvPr id="52" name="ZoneTexte 51"/>
@@ -17951,7 +19573,7 @@
             </p:txBody>
           </p:sp>
         </mc:Choice>
-        <mc:Fallback xmlns="">
+        <mc:Fallback>
           <p:sp>
             <p:nvSpPr>
               <p:cNvPr id="52" name="ZoneTexte 51"/>
@@ -17990,8 +19612,8 @@
           </p:sp>
         </mc:Fallback>
       </mc:AlternateContent>
-      <mc:AlternateContent xmlns:mc="http://schemas.openxmlformats.org/markup-compatibility/2006" xmlns:a14="http://schemas.microsoft.com/office/drawing/2010/main">
-        <mc:Choice Requires="a14">
+      <mc:AlternateContent xmlns:mc="http://schemas.openxmlformats.org/markup-compatibility/2006">
+        <mc:Choice xmlns:a14="http://schemas.microsoft.com/office/drawing/2010/main" xmlns="" Requires="a14">
           <p:sp>
             <p:nvSpPr>
               <p:cNvPr id="53" name="ZoneTexte 52"/>
@@ -18066,7 +19688,7 @@
             </p:txBody>
           </p:sp>
         </mc:Choice>
-        <mc:Fallback xmlns="">
+        <mc:Fallback>
           <p:sp>
             <p:nvSpPr>
               <p:cNvPr id="53" name="ZoneTexte 52"/>
@@ -18131,7 +19753,7 @@
     </p:spTree>
     <p:extLst>
       <p:ext uri="{BB962C8B-B14F-4D97-AF65-F5344CB8AC3E}">
-        <p14:creationId xmlns:p14="http://schemas.microsoft.com/office/powerpoint/2010/main" val="746388898"/>
+        <p14:creationId xmlns:p14="http://schemas.microsoft.com/office/powerpoint/2010/main" xmlns="" val="746388898"/>
       </p:ext>
     </p:extLst>
   </p:cSld>

</xml_diff>